<commit_message>
Added Trello to card sort apps to try.
</commit_message>
<xml_diff>
--- a/slides/classfive/slides.pptx
+++ b/slides/classfive/slides.pptx
@@ -225,7 +225,7 @@
           <a:p>
             <a:fld id="{9B5D41C8-0A92-DD47-AB00-F0EFFD66679B}" type="datetimeFigureOut">
               <a:rPr lang="en-US" smtClean="0"/>
-              <a:t>10/7/11</a:t>
+              <a:t>10/10/11</a:t>
             </a:fld>
             <a:endParaRPr lang="en-US"/>
           </a:p>
@@ -1841,7 +1841,7 @@
             <a:fld id="{B7C3F878-F5E8-489B-AC8A-64F2A7E22C28}" type="datetimeFigureOut">
               <a:rPr lang="en-US" smtClean="0"/>
               <a:pPr/>
-              <a:t>10/7/11</a:t>
+              <a:t>10/10/11</a:t>
             </a:fld>
             <a:endParaRPr lang="en-US"/>
           </a:p>
@@ -2048,7 +2048,7 @@
             <a:fld id="{B7C3F878-F5E8-489B-AC8A-64F2A7E22C28}" type="datetimeFigureOut">
               <a:rPr lang="en-US" smtClean="0"/>
               <a:pPr/>
-              <a:t>10/7/11</a:t>
+              <a:t>10/10/11</a:t>
             </a:fld>
             <a:endParaRPr lang="en-US"/>
           </a:p>
@@ -2255,7 +2255,7 @@
             <a:fld id="{B7C3F878-F5E8-489B-AC8A-64F2A7E22C28}" type="datetimeFigureOut">
               <a:rPr lang="en-US" smtClean="0"/>
               <a:pPr/>
-              <a:t>10/7/11</a:t>
+              <a:t>10/10/11</a:t>
             </a:fld>
             <a:endParaRPr lang="en-US"/>
           </a:p>
@@ -2448,7 +2448,7 @@
             <a:fld id="{B7C3F878-F5E8-489B-AC8A-64F2A7E22C28}" type="datetimeFigureOut">
               <a:rPr lang="en-US" smtClean="0"/>
               <a:pPr/>
-              <a:t>10/7/11</a:t>
+              <a:t>10/10/11</a:t>
             </a:fld>
             <a:endParaRPr lang="en-US"/>
           </a:p>
@@ -2689,7 +2689,7 @@
             <a:fld id="{B7C3F878-F5E8-489B-AC8A-64F2A7E22C28}" type="datetimeFigureOut">
               <a:rPr lang="en-US" smtClean="0"/>
               <a:pPr/>
-              <a:t>10/7/11</a:t>
+              <a:t>10/10/11</a:t>
             </a:fld>
             <a:endParaRPr lang="en-US"/>
           </a:p>
@@ -2804,7 +2804,7 @@
             <a:fld id="{B7C3F878-F5E8-489B-AC8A-64F2A7E22C28}" type="datetimeFigureOut">
               <a:rPr lang="en-US" smtClean="0"/>
               <a:pPr/>
-              <a:t>10/7/11</a:t>
+              <a:t>10/10/11</a:t>
             </a:fld>
             <a:endParaRPr lang="en-US"/>
           </a:p>
@@ -3236,7 +3236,7 @@
             <a:fld id="{B7C3F878-F5E8-489B-AC8A-64F2A7E22C28}" type="datetimeFigureOut">
               <a:rPr lang="en-US" smtClean="0"/>
               <a:pPr/>
-              <a:t>10/7/11</a:t>
+              <a:t>10/10/11</a:t>
             </a:fld>
             <a:endParaRPr lang="en-US"/>
           </a:p>
@@ -3517,7 +3517,7 @@
             <a:fld id="{B7C3F878-F5E8-489B-AC8A-64F2A7E22C28}" type="datetimeFigureOut">
               <a:rPr lang="en-US" smtClean="0"/>
               <a:pPr/>
-              <a:t>10/7/11</a:t>
+              <a:t>10/10/11</a:t>
             </a:fld>
             <a:endParaRPr lang="en-US"/>
           </a:p>
@@ -3609,7 +3609,7 @@
             <a:fld id="{B7C3F878-F5E8-489B-AC8A-64F2A7E22C28}" type="datetimeFigureOut">
               <a:rPr lang="en-US" smtClean="0"/>
               <a:pPr/>
-              <a:t>10/7/11</a:t>
+              <a:t>10/10/11</a:t>
             </a:fld>
             <a:endParaRPr lang="en-US"/>
           </a:p>
@@ -4448,7 +4448,7 @@
             <a:fld id="{B7C3F878-F5E8-489B-AC8A-64F2A7E22C28}" type="datetimeFigureOut">
               <a:rPr lang="en-US" smtClean="0"/>
               <a:pPr/>
-              <a:t>10/7/11</a:t>
+              <a:t>10/10/11</a:t>
             </a:fld>
             <a:endParaRPr lang="en-US"/>
           </a:p>
@@ -5281,7 +5281,7 @@
             <a:fld id="{B7C3F878-F5E8-489B-AC8A-64F2A7E22C28}" type="datetimeFigureOut">
               <a:rPr lang="en-US" smtClean="0"/>
               <a:pPr/>
-              <a:t>10/7/11</a:t>
+              <a:t>10/10/11</a:t>
             </a:fld>
             <a:endParaRPr lang="en-US"/>
           </a:p>
@@ -5937,7 +5937,7 @@
             <a:fld id="{B7C3F878-F5E8-489B-AC8A-64F2A7E22C28}" type="datetimeFigureOut">
               <a:rPr lang="en-US" smtClean="0"/>
               <a:pPr/>
-              <a:t>10/7/11</a:t>
+              <a:t>10/10/11</a:t>
             </a:fld>
             <a:endParaRPr lang="en-US" dirty="0"/>
           </a:p>
@@ -9659,6 +9659,10 @@
           <a:bodyPr/>
           <a:lstStyle/>
           <a:p>
+            <a:r>
+              <a:rPr lang="en-US" dirty="0" smtClean="0"/>
+              <a:t>Nothing</a:t>
+            </a:r>
             <a:endParaRPr lang="en-US" dirty="0"/>
           </a:p>
         </p:txBody>
@@ -10096,7 +10100,41 @@
               <a:rPr lang="en-US" dirty="0" smtClean="0">
                 <a:hlinkClick r:id="rId3"/>
               </a:rPr>
-              <a:t>http://www.lucidchart.com/</a:t>
+              <a:t>http://www.lucidchart.com</a:t>
+            </a:r>
+            <a:r>
+              <a:rPr lang="en-US" dirty="0" smtClean="0">
+                <a:hlinkClick r:id="rId3"/>
+              </a:rPr>
+              <a:t>/</a:t>
+            </a:r>
+            <a:endParaRPr lang="en-US" dirty="0" smtClean="0"/>
+          </a:p>
+          <a:p>
+            <a:r>
+              <a:rPr lang="en-US" dirty="0" smtClean="0"/>
+              <a:t>Or use </a:t>
+            </a:r>
+            <a:r>
+              <a:rPr lang="en-US" dirty="0" err="1" smtClean="0"/>
+              <a:t>Trello</a:t>
+            </a:r>
+            <a:r>
+              <a:rPr lang="en-US" dirty="0" smtClean="0"/>
+              <a:t>: </a:t>
+            </a:r>
+            <a:r>
+              <a:rPr lang="en-US" dirty="0" smtClean="0">
+                <a:hlinkClick r:id="rId4"/>
+              </a:rPr>
+              <a:t>https://trello.com/</a:t>
+            </a:r>
+            <a:endParaRPr lang="en-US" dirty="0" smtClean="0"/>
+          </a:p>
+          <a:p>
+            <a:r>
+              <a:rPr lang="en-US" dirty="0" smtClean="0"/>
+              <a:t>Or use Microsoft Word or PowerPoint</a:t>
             </a:r>
             <a:endParaRPr lang="en-US" dirty="0" smtClean="0"/>
           </a:p>

</xml_diff>

<commit_message>
Added review slides to discuss theme and brainstorming based on assignment 3.
</commit_message>
<xml_diff>
--- a/slides/classfive/slides.pptx
+++ b/slides/classfive/slides.pptx
@@ -5,43 +5,45 @@
     <p:sldMasterId id="2147483660" r:id="rId1"/>
   </p:sldMasterIdLst>
   <p:notesMasterIdLst>
-    <p:notesMasterId r:id="rId36"/>
+    <p:notesMasterId r:id="rId38"/>
   </p:notesMasterIdLst>
   <p:sldIdLst>
     <p:sldId id="256" r:id="rId2"/>
     <p:sldId id="257" r:id="rId3"/>
-    <p:sldId id="342" r:id="rId4"/>
-    <p:sldId id="258" r:id="rId5"/>
-    <p:sldId id="259" r:id="rId6"/>
-    <p:sldId id="311" r:id="rId7"/>
-    <p:sldId id="315" r:id="rId8"/>
-    <p:sldId id="367" r:id="rId9"/>
-    <p:sldId id="382" r:id="rId10"/>
-    <p:sldId id="366" r:id="rId11"/>
-    <p:sldId id="368" r:id="rId12"/>
-    <p:sldId id="369" r:id="rId13"/>
-    <p:sldId id="370" r:id="rId14"/>
-    <p:sldId id="371" r:id="rId15"/>
-    <p:sldId id="383" r:id="rId16"/>
-    <p:sldId id="372" r:id="rId17"/>
-    <p:sldId id="373" r:id="rId18"/>
-    <p:sldId id="381" r:id="rId19"/>
-    <p:sldId id="374" r:id="rId20"/>
-    <p:sldId id="375" r:id="rId21"/>
-    <p:sldId id="376" r:id="rId22"/>
-    <p:sldId id="378" r:id="rId23"/>
-    <p:sldId id="356" r:id="rId24"/>
-    <p:sldId id="379" r:id="rId25"/>
-    <p:sldId id="380" r:id="rId26"/>
-    <p:sldId id="377" r:id="rId27"/>
-    <p:sldId id="312" r:id="rId28"/>
-    <p:sldId id="268" r:id="rId29"/>
-    <p:sldId id="361" r:id="rId30"/>
-    <p:sldId id="362" r:id="rId31"/>
-    <p:sldId id="363" r:id="rId32"/>
-    <p:sldId id="364" r:id="rId33"/>
-    <p:sldId id="365" r:id="rId34"/>
-    <p:sldId id="267" r:id="rId35"/>
+    <p:sldId id="384" r:id="rId4"/>
+    <p:sldId id="385" r:id="rId5"/>
+    <p:sldId id="342" r:id="rId6"/>
+    <p:sldId id="258" r:id="rId7"/>
+    <p:sldId id="259" r:id="rId8"/>
+    <p:sldId id="311" r:id="rId9"/>
+    <p:sldId id="315" r:id="rId10"/>
+    <p:sldId id="367" r:id="rId11"/>
+    <p:sldId id="382" r:id="rId12"/>
+    <p:sldId id="366" r:id="rId13"/>
+    <p:sldId id="368" r:id="rId14"/>
+    <p:sldId id="369" r:id="rId15"/>
+    <p:sldId id="370" r:id="rId16"/>
+    <p:sldId id="371" r:id="rId17"/>
+    <p:sldId id="383" r:id="rId18"/>
+    <p:sldId id="372" r:id="rId19"/>
+    <p:sldId id="373" r:id="rId20"/>
+    <p:sldId id="381" r:id="rId21"/>
+    <p:sldId id="374" r:id="rId22"/>
+    <p:sldId id="375" r:id="rId23"/>
+    <p:sldId id="376" r:id="rId24"/>
+    <p:sldId id="378" r:id="rId25"/>
+    <p:sldId id="356" r:id="rId26"/>
+    <p:sldId id="379" r:id="rId27"/>
+    <p:sldId id="380" r:id="rId28"/>
+    <p:sldId id="377" r:id="rId29"/>
+    <p:sldId id="312" r:id="rId30"/>
+    <p:sldId id="268" r:id="rId31"/>
+    <p:sldId id="361" r:id="rId32"/>
+    <p:sldId id="362" r:id="rId33"/>
+    <p:sldId id="363" r:id="rId34"/>
+    <p:sldId id="364" r:id="rId35"/>
+    <p:sldId id="365" r:id="rId36"/>
+    <p:sldId id="267" r:id="rId37"/>
   </p:sldIdLst>
   <p:sldSz cx="9144000" cy="6858000" type="screen4x3"/>
   <p:notesSz cx="6858000" cy="9144000"/>
@@ -650,7 +652,7 @@
           <a:p>
             <a:fld id="{F0AB357A-3C6D-9E43-AB07-807CDFEA83A0}" type="slidenum">
               <a:rPr lang="en-US" smtClean="0"/>
-              <a:t>4</a:t>
+              <a:t>6</a:t>
             </a:fld>
             <a:endParaRPr lang="en-US"/>
           </a:p>
@@ -746,7 +748,7 @@
           <a:p>
             <a:fld id="{F0AB357A-3C6D-9E43-AB07-807CDFEA83A0}" type="slidenum">
               <a:rPr lang="en-US" smtClean="0"/>
-              <a:t>5</a:t>
+              <a:t>7</a:t>
             </a:fld>
             <a:endParaRPr lang="en-US"/>
           </a:p>
@@ -834,7 +836,7 @@
           <a:p>
             <a:fld id="{F0AB357A-3C6D-9E43-AB07-807CDFEA83A0}" type="slidenum">
               <a:rPr lang="en-US" smtClean="0"/>
-              <a:t>6</a:t>
+              <a:t>8</a:t>
             </a:fld>
             <a:endParaRPr lang="en-US"/>
           </a:p>
@@ -922,7 +924,7 @@
           <a:p>
             <a:fld id="{F0AB357A-3C6D-9E43-AB07-807CDFEA83A0}" type="slidenum">
               <a:rPr lang="en-US" smtClean="0"/>
-              <a:t>15</a:t>
+              <a:t>17</a:t>
             </a:fld>
             <a:endParaRPr lang="en-US"/>
           </a:p>
@@ -1010,7 +1012,7 @@
           <a:p>
             <a:fld id="{F0AB357A-3C6D-9E43-AB07-807CDFEA83A0}" type="slidenum">
               <a:rPr lang="en-US" smtClean="0"/>
-              <a:t>27</a:t>
+              <a:t>29</a:t>
             </a:fld>
             <a:endParaRPr lang="en-US"/>
           </a:p>
@@ -1098,7 +1100,7 @@
           <a:p>
             <a:fld id="{F0AB357A-3C6D-9E43-AB07-807CDFEA83A0}" type="slidenum">
               <a:rPr lang="en-US" smtClean="0"/>
-              <a:t>28</a:t>
+              <a:t>30</a:t>
             </a:fld>
             <a:endParaRPr lang="en-US"/>
           </a:p>
@@ -1194,7 +1196,7 @@
           <a:p>
             <a:fld id="{F0AB357A-3C6D-9E43-AB07-807CDFEA83A0}" type="slidenum">
               <a:rPr lang="en-US" smtClean="0"/>
-              <a:t>34</a:t>
+              <a:t>36</a:t>
             </a:fld>
             <a:endParaRPr lang="en-US"/>
           </a:p>
@@ -6498,7 +6500,7 @@
           <a:p>
             <a:r>
               <a:rPr lang="en-US" dirty="0" smtClean="0"/>
-              <a:t>position</a:t>
+              <a:t>display</a:t>
             </a:r>
             <a:endParaRPr lang="en-US" dirty="0"/>
           </a:p>
@@ -6527,20 +6529,20 @@
               <a:rPr lang="en-US" dirty="0" smtClean="0">
                 <a:hlinkClick r:id="rId2"/>
               </a:rPr>
-              <a:t>http://www.w3.org/TR/CSS21/visuren.html - propdef-position</a:t>
+              <a:t>http://www.w3.org/TR/CSS21/visuren.html - propdef-display</a:t>
             </a:r>
             <a:endParaRPr lang="en-US" dirty="0" smtClean="0"/>
           </a:p>
           <a:p>
             <a:r>
               <a:rPr lang="en-US" dirty="0" smtClean="0"/>
-              <a:t>Positions an element</a:t>
-            </a:r>
-          </a:p>
-          <a:p>
-            <a:r>
-              <a:rPr lang="en-US" dirty="0" smtClean="0"/>
-              <a:t>Can be static, relative, absolute, fixed</a:t>
+              <a:t>Sets the type of a box an element lives in</a:t>
+            </a:r>
+          </a:p>
+          <a:p>
+            <a:r>
+              <a:rPr lang="en-US" dirty="0" smtClean="0"/>
+              <a:t>Can be inline, block, list-item, inline-block, none</a:t>
             </a:r>
           </a:p>
           <a:p>
@@ -6549,14 +6551,11 @@
                 <a:latin typeface="Courier New"/>
                 <a:cs typeface="Courier New"/>
               </a:rPr>
-              <a:t>position: absolute;</a:t>
-            </a:r>
-          </a:p>
-          <a:p>
-            <a:endParaRPr lang="en-US" dirty="0" smtClean="0"/>
-          </a:p>
-          <a:p>
-            <a:endParaRPr lang="en-US" dirty="0" smtClean="0"/>
+              <a:t>display: block;</a:t>
+            </a:r>
+          </a:p>
+          <a:p>
+            <a:endParaRPr lang="en-US" dirty="0"/>
           </a:p>
         </p:txBody>
       </p:sp>
@@ -6576,41 +6575,17 @@
           <a:lstStyle/>
           <a:p>
             <a:r>
-              <a:rPr lang="en-US" dirty="0" smtClean="0"/>
-              <a:t>http://</a:t>
-            </a:r>
-            <a:r>
-              <a:rPr lang="en-US" dirty="0" err="1" smtClean="0"/>
-              <a:t>dl.dropbox.com</a:t>
-            </a:r>
-            <a:r>
-              <a:rPr lang="en-US" dirty="0" smtClean="0"/>
-              <a:t>/u/41609448/art329/slides/</a:t>
-            </a:r>
-            <a:r>
-              <a:rPr lang="en-US" dirty="0" err="1" smtClean="0"/>
-              <a:t>classfive</a:t>
-            </a:r>
-            <a:r>
-              <a:rPr lang="en-US" dirty="0" smtClean="0"/>
-              <a:t>/slides/position/</a:t>
-            </a:r>
-            <a:r>
-              <a:rPr lang="en-US" dirty="0" err="1" smtClean="0"/>
-              <a:t>index.html</a:t>
-            </a:r>
-            <a:r>
-              <a:rPr lang="en-US" dirty="0" smtClean="0"/>
-              <a:t> </a:t>
-            </a:r>
-            <a:endParaRPr lang="en-US" dirty="0"/>
+              <a:rPr lang="en-US" smtClean="0"/>
+              <a:t>http://dl.dropbox.com/u/41609448/art329/slides/classfive/slides/display/index.html  </a:t>
+            </a:r>
+            <a:endParaRPr lang="en-US"/>
           </a:p>
         </p:txBody>
       </p:sp>
     </p:spTree>
     <p:extLst>
       <p:ext uri="{BB962C8B-B14F-4D97-AF65-F5344CB8AC3E}">
-        <p14:creationId xmlns:p14="http://schemas.microsoft.com/office/powerpoint/2010/main" val="857961007"/>
+        <p14:creationId xmlns:p14="http://schemas.microsoft.com/office/powerpoint/2010/main" val="103994896"/>
       </p:ext>
     </p:extLst>
   </p:cSld>
@@ -6654,7 +6629,7 @@
           <a:p>
             <a:r>
               <a:rPr lang="en-US" dirty="0" smtClean="0"/>
-              <a:t>top, right, bottom, left</a:t>
+              <a:t>list-style</a:t>
             </a:r>
             <a:endParaRPr lang="en-US" dirty="0"/>
           </a:p>
@@ -6672,7 +6647,9 @@
         </p:nvSpPr>
         <p:spPr/>
         <p:txBody>
-          <a:bodyPr/>
+          <a:bodyPr>
+            <a:normAutofit fontScale="85000" lnSpcReduction="20000"/>
+          </a:bodyPr>
           <a:lstStyle/>
           <a:p>
             <a:r>
@@ -6683,26 +6660,140 @@
               <a:rPr lang="en-US" dirty="0" smtClean="0">
                 <a:hlinkClick r:id="rId2"/>
               </a:rPr>
-              <a:t>http://www.w3.org/TR/CSS21/visuren.html - position-props</a:t>
+              <a:t>http://www.w3.org/TR/CSS21/generate.html - propdef-list-style</a:t>
             </a:r>
             <a:endParaRPr lang="en-US" dirty="0" smtClean="0"/>
           </a:p>
           <a:p>
             <a:r>
               <a:rPr lang="en-US" dirty="0" smtClean="0"/>
-              <a:t>Sets how much to offset the position</a:t>
-            </a:r>
-          </a:p>
-          <a:p>
-            <a:r>
-              <a:rPr lang="en-US" dirty="0" smtClean="0"/>
-              <a:t>Can be length, %, or auto</a:t>
-            </a:r>
-          </a:p>
-          <a:p>
-            <a:r>
-              <a:rPr lang="en-US" dirty="0" smtClean="0"/>
-              <a:t>Can be negative</a:t>
+              <a:t>Sets the style properties of the list: type, position, image</a:t>
+            </a:r>
+          </a:p>
+          <a:p>
+            <a:r>
+              <a:rPr lang="en-US" dirty="0" smtClean="0"/>
+              <a:t>list-style</a:t>
+            </a:r>
+            <a:r>
+              <a:rPr lang="en-US" dirty="0"/>
+              <a:t>-type: </a:t>
+            </a:r>
+            <a:r>
+              <a:rPr lang="en-US" dirty="0" smtClean="0"/>
+              <a:t>disc, circle, square, decimal, </a:t>
+            </a:r>
+            <a:r>
+              <a:rPr lang="en-US" dirty="0"/>
+              <a:t>decimal-leading-</a:t>
+            </a:r>
+            <a:r>
+              <a:rPr lang="en-US" dirty="0" smtClean="0"/>
+              <a:t>zero, </a:t>
+            </a:r>
+            <a:r>
+              <a:rPr lang="en-US" dirty="0"/>
+              <a:t>lower-</a:t>
+            </a:r>
+            <a:r>
+              <a:rPr lang="en-US" dirty="0" smtClean="0"/>
+              <a:t>roman, </a:t>
+            </a:r>
+            <a:r>
+              <a:rPr lang="en-US" dirty="0"/>
+              <a:t>upper-</a:t>
+            </a:r>
+            <a:r>
+              <a:rPr lang="en-US" dirty="0" smtClean="0"/>
+              <a:t>roman, </a:t>
+            </a:r>
+            <a:r>
+              <a:rPr lang="en-US" dirty="0"/>
+              <a:t>lower-</a:t>
+            </a:r>
+            <a:r>
+              <a:rPr lang="en-US" dirty="0" err="1" smtClean="0"/>
+              <a:t>greek</a:t>
+            </a:r>
+            <a:r>
+              <a:rPr lang="en-US" dirty="0" smtClean="0"/>
+              <a:t>, lower-</a:t>
+            </a:r>
+            <a:r>
+              <a:rPr lang="en-US" dirty="0" err="1" smtClean="0"/>
+              <a:t>latin</a:t>
+            </a:r>
+            <a:r>
+              <a:rPr lang="en-US" dirty="0"/>
+              <a:t>,</a:t>
+            </a:r>
+            <a:r>
+              <a:rPr lang="en-US" dirty="0" smtClean="0"/>
+              <a:t> upper-</a:t>
+            </a:r>
+            <a:r>
+              <a:rPr lang="en-US" dirty="0" err="1" smtClean="0"/>
+              <a:t>latin</a:t>
+            </a:r>
+            <a:r>
+              <a:rPr lang="en-US" dirty="0"/>
+              <a:t>,</a:t>
+            </a:r>
+            <a:r>
+              <a:rPr lang="en-US" dirty="0" smtClean="0"/>
+              <a:t> </a:t>
+            </a:r>
+            <a:r>
+              <a:rPr lang="en-US" dirty="0" err="1" smtClean="0"/>
+              <a:t>armenian</a:t>
+            </a:r>
+            <a:r>
+              <a:rPr lang="en-US" dirty="0"/>
+              <a:t>,</a:t>
+            </a:r>
+            <a:r>
+              <a:rPr lang="en-US" dirty="0" smtClean="0"/>
+              <a:t> </a:t>
+            </a:r>
+            <a:r>
+              <a:rPr lang="en-US" dirty="0" err="1" smtClean="0"/>
+              <a:t>georgian</a:t>
+            </a:r>
+            <a:r>
+              <a:rPr lang="en-US" dirty="0"/>
+              <a:t>,</a:t>
+            </a:r>
+            <a:r>
+              <a:rPr lang="en-US" dirty="0" smtClean="0"/>
+              <a:t> lower-alpha, upper-alpha, none</a:t>
+            </a:r>
+          </a:p>
+          <a:p>
+            <a:r>
+              <a:rPr lang="en-US" dirty="0" smtClean="0"/>
+              <a:t>list-style-position: inside, outside</a:t>
+            </a:r>
+          </a:p>
+          <a:p>
+            <a:r>
+              <a:rPr lang="en-US" dirty="0" smtClean="0"/>
+              <a:t>List-style-image: </a:t>
+            </a:r>
+            <a:r>
+              <a:rPr lang="en-US" dirty="0" err="1" smtClean="0"/>
+              <a:t>url</a:t>
+            </a:r>
+            <a:r>
+              <a:rPr lang="en-US" dirty="0" smtClean="0"/>
+              <a:t>('</a:t>
+            </a:r>
+            <a:r>
+              <a:rPr lang="en-US" dirty="0" err="1" smtClean="0"/>
+              <a:t>bullet.png</a:t>
+            </a:r>
+            <a:r>
+              <a:rPr lang="en-US" dirty="0" smtClean="0"/>
+              <a:t>'), none</a:t>
             </a:r>
           </a:p>
           <a:p>
@@ -6711,12 +6802,11 @@
                 <a:latin typeface="Courier New"/>
                 <a:cs typeface="Courier New"/>
               </a:rPr>
-              <a:t>top: 8px; right: -20%;</a:t>
-            </a:r>
-            <a:endParaRPr lang="en-US" sz="2000" dirty="0">
-              <a:latin typeface="Courier New"/>
-              <a:cs typeface="Courier New"/>
-            </a:endParaRPr>
+              <a:t>list-style: disc inside none;</a:t>
+            </a:r>
+          </a:p>
+          <a:p>
+            <a:endParaRPr lang="en-US" dirty="0"/>
           </a:p>
         </p:txBody>
       </p:sp>
@@ -6736,35 +6826,39 @@
           <a:lstStyle/>
           <a:p>
             <a:r>
-              <a:rPr lang="en-US" dirty="0" smtClean="0"/>
+              <a:rPr lang="en-US" dirty="0"/>
               <a:t>http://</a:t>
             </a:r>
             <a:r>
+              <a:rPr lang="en-US" dirty="0" err="1"/>
+              <a:t>dl.dropbox.com</a:t>
+            </a:r>
+            <a:r>
+              <a:rPr lang="en-US" dirty="0"/>
+              <a:t>/u/41609448/art329/slides/</a:t>
+            </a:r>
+            <a:r>
+              <a:rPr lang="en-US" dirty="0" err="1"/>
+              <a:t>classfour</a:t>
+            </a:r>
+            <a:r>
+              <a:rPr lang="en-US" dirty="0"/>
+              <a:t>/slides</a:t>
+            </a:r>
+            <a:r>
+              <a:rPr lang="en-US" dirty="0" smtClean="0"/>
+              <a:t>/</a:t>
+            </a:r>
+            <a:r>
               <a:rPr lang="en-US" dirty="0" err="1" smtClean="0"/>
-              <a:t>dl.dropbox.com</a:t>
-            </a:r>
-            <a:r>
-              <a:rPr lang="en-US" dirty="0" smtClean="0"/>
-              <a:t>/u/41609448/art329/slides/</a:t>
-            </a:r>
-            <a:r>
-              <a:rPr lang="en-US" dirty="0" err="1" smtClean="0"/>
-              <a:t>classfive</a:t>
-            </a:r>
-            <a:r>
-              <a:rPr lang="en-US" dirty="0" smtClean="0"/>
-              <a:t>/slides/</a:t>
-            </a:r>
-            <a:r>
-              <a:rPr lang="en-US" dirty="0" err="1" smtClean="0"/>
-              <a:t>position_offset</a:t>
+              <a:t>liststyle</a:t>
             </a:r>
             <a:r>
               <a:rPr lang="en-US" dirty="0" smtClean="0"/>
               <a:t>/</a:t>
             </a:r>
             <a:r>
-              <a:rPr lang="en-US" dirty="0" err="1" smtClean="0"/>
+              <a:rPr lang="en-US" dirty="0" err="1"/>
               <a:t>index.html</a:t>
             </a:r>
             <a:endParaRPr lang="en-US" dirty="0"/>
@@ -6774,7 +6868,7 @@
     </p:spTree>
     <p:extLst>
       <p:ext uri="{BB962C8B-B14F-4D97-AF65-F5344CB8AC3E}">
-        <p14:creationId xmlns:p14="http://schemas.microsoft.com/office/powerpoint/2010/main" val="2571923580"/>
+        <p14:creationId xmlns:p14="http://schemas.microsoft.com/office/powerpoint/2010/main" val="3840415387"/>
       </p:ext>
     </p:extLst>
   </p:cSld>
@@ -6818,7 +6912,7 @@
           <a:p>
             <a:r>
               <a:rPr lang="en-US" dirty="0" smtClean="0"/>
-              <a:t>z-index</a:t>
+              <a:t>position</a:t>
             </a:r>
             <a:endParaRPr lang="en-US" dirty="0"/>
           </a:p>
@@ -6836,9 +6930,7 @@
         </p:nvSpPr>
         <p:spPr/>
         <p:txBody>
-          <a:bodyPr>
-            <a:normAutofit/>
-          </a:bodyPr>
+          <a:bodyPr/>
           <a:lstStyle/>
           <a:p>
             <a:r>
@@ -6849,26 +6941,20 @@
               <a:rPr lang="en-US" dirty="0" smtClean="0">
                 <a:hlinkClick r:id="rId2"/>
               </a:rPr>
-              <a:t>http://www.w3.org/TR/CSS21/visuren.html - z-index</a:t>
+              <a:t>http://www.w3.org/TR/CSS21/visuren.html - propdef-position</a:t>
             </a:r>
             <a:endParaRPr lang="en-US" dirty="0" smtClean="0"/>
           </a:p>
           <a:p>
             <a:r>
               <a:rPr lang="en-US" dirty="0" smtClean="0"/>
-              <a:t>Sets the "stack level" of a positioned element</a:t>
-            </a:r>
-          </a:p>
-          <a:p>
-            <a:r>
-              <a:rPr lang="en-US" dirty="0" smtClean="0"/>
-              <a:t>Can be auto, integer</a:t>
-            </a:r>
-          </a:p>
-          <a:p>
-            <a:r>
-              <a:rPr lang="en-US" dirty="0" smtClean="0"/>
-              <a:t>Higher numbers are "in front of" lower numbers</a:t>
+              <a:t>Positions an element</a:t>
+            </a:r>
+          </a:p>
+          <a:p>
+            <a:r>
+              <a:rPr lang="en-US" dirty="0" smtClean="0"/>
+              <a:t>Can be static, relative, absolute, fixed</a:t>
             </a:r>
           </a:p>
           <a:p>
@@ -6877,12 +6963,14 @@
                 <a:latin typeface="Courier New"/>
                 <a:cs typeface="Courier New"/>
               </a:rPr>
-              <a:t>z-index: 99;</a:t>
-            </a:r>
-            <a:endParaRPr lang="en-US" sz="2000" dirty="0">
-              <a:latin typeface="Courier New"/>
-              <a:cs typeface="Courier New"/>
-            </a:endParaRPr>
+              <a:t>position: absolute;</a:t>
+            </a:r>
+          </a:p>
+          <a:p>
+            <a:endParaRPr lang="en-US" dirty="0" smtClean="0"/>
+          </a:p>
+          <a:p>
+            <a:endParaRPr lang="en-US" dirty="0" smtClean="0"/>
           </a:p>
         </p:txBody>
       </p:sp>
@@ -6919,15 +7007,7 @@
             </a:r>
             <a:r>
               <a:rPr lang="en-US" dirty="0" smtClean="0"/>
-              <a:t>/slides/</a:t>
-            </a:r>
-            <a:r>
-              <a:rPr lang="en-US" dirty="0" err="1" smtClean="0"/>
-              <a:t>zindex</a:t>
-            </a:r>
-            <a:r>
-              <a:rPr lang="en-US" dirty="0" smtClean="0"/>
-              <a:t>/</a:t>
+              <a:t>/slides/position/</a:t>
             </a:r>
             <a:r>
               <a:rPr lang="en-US" dirty="0" err="1" smtClean="0"/>
@@ -6944,7 +7024,7 @@
     </p:spTree>
     <p:extLst>
       <p:ext uri="{BB962C8B-B14F-4D97-AF65-F5344CB8AC3E}">
-        <p14:creationId xmlns:p14="http://schemas.microsoft.com/office/powerpoint/2010/main" val="1765848951"/>
+        <p14:creationId xmlns:p14="http://schemas.microsoft.com/office/powerpoint/2010/main" val="857961007"/>
       </p:ext>
     </p:extLst>
   </p:cSld>
@@ -6988,7 +7068,7 @@
           <a:p>
             <a:r>
               <a:rPr lang="en-US" dirty="0" smtClean="0"/>
-              <a:t>float</a:t>
+              <a:t>top, right, bottom, left</a:t>
             </a:r>
             <a:endParaRPr lang="en-US" dirty="0"/>
           </a:p>
@@ -7017,20 +7097,26 @@
               <a:rPr lang="en-US" dirty="0" smtClean="0">
                 <a:hlinkClick r:id="rId2"/>
               </a:rPr>
-              <a:t>http://www.w3.org/TR/CSS21/visuren.html - propdef-float</a:t>
+              <a:t>http://www.w3.org/TR/CSS21/visuren.html - position-props</a:t>
             </a:r>
             <a:endParaRPr lang="en-US" dirty="0" smtClean="0"/>
           </a:p>
           <a:p>
             <a:r>
               <a:rPr lang="en-US" dirty="0" smtClean="0"/>
-              <a:t>Used to float an element along other elements</a:t>
-            </a:r>
-          </a:p>
-          <a:p>
-            <a:r>
-              <a:rPr lang="en-US" dirty="0" smtClean="0"/>
-              <a:t>Can be left, right, none</a:t>
+              <a:t>Sets how much to offset the position</a:t>
+            </a:r>
+          </a:p>
+          <a:p>
+            <a:r>
+              <a:rPr lang="en-US" dirty="0" smtClean="0"/>
+              <a:t>Can be length, %, or auto</a:t>
+            </a:r>
+          </a:p>
+          <a:p>
+            <a:r>
+              <a:rPr lang="en-US" dirty="0" smtClean="0"/>
+              <a:t>Can be negative</a:t>
             </a:r>
           </a:p>
           <a:p>
@@ -7039,7 +7125,7 @@
                 <a:latin typeface="Courier New"/>
                 <a:cs typeface="Courier New"/>
               </a:rPr>
-              <a:t>float: left;</a:t>
+              <a:t>top: 8px; right: -20%;</a:t>
             </a:r>
             <a:endParaRPr lang="en-US" sz="2000" dirty="0">
               <a:latin typeface="Courier New"/>
@@ -7064,17 +7150,45 @@
           <a:lstStyle/>
           <a:p>
             <a:r>
-              <a:rPr lang="en-US" smtClean="0"/>
-              <a:t>http://dl.dropbox.com/u/41609448/art329/slides/classfive/slides/float/index.html  </a:t>
-            </a:r>
-            <a:endParaRPr lang="en-US"/>
+              <a:rPr lang="en-US" dirty="0" smtClean="0"/>
+              <a:t>http://</a:t>
+            </a:r>
+            <a:r>
+              <a:rPr lang="en-US" dirty="0" err="1" smtClean="0"/>
+              <a:t>dl.dropbox.com</a:t>
+            </a:r>
+            <a:r>
+              <a:rPr lang="en-US" dirty="0" smtClean="0"/>
+              <a:t>/u/41609448/art329/slides/</a:t>
+            </a:r>
+            <a:r>
+              <a:rPr lang="en-US" dirty="0" err="1" smtClean="0"/>
+              <a:t>classfive</a:t>
+            </a:r>
+            <a:r>
+              <a:rPr lang="en-US" dirty="0" smtClean="0"/>
+              <a:t>/slides/</a:t>
+            </a:r>
+            <a:r>
+              <a:rPr lang="en-US" dirty="0" err="1" smtClean="0"/>
+              <a:t>position_offset</a:t>
+            </a:r>
+            <a:r>
+              <a:rPr lang="en-US" dirty="0" smtClean="0"/>
+              <a:t>/</a:t>
+            </a:r>
+            <a:r>
+              <a:rPr lang="en-US" dirty="0" err="1" smtClean="0"/>
+              <a:t>index.html</a:t>
+            </a:r>
+            <a:endParaRPr lang="en-US" dirty="0"/>
           </a:p>
         </p:txBody>
       </p:sp>
     </p:spTree>
     <p:extLst>
       <p:ext uri="{BB962C8B-B14F-4D97-AF65-F5344CB8AC3E}">
-        <p14:creationId xmlns:p14="http://schemas.microsoft.com/office/powerpoint/2010/main" val="409718624"/>
+        <p14:creationId xmlns:p14="http://schemas.microsoft.com/office/powerpoint/2010/main" val="2571923580"/>
       </p:ext>
     </p:extLst>
   </p:cSld>
@@ -7118,7 +7232,7 @@
           <a:p>
             <a:r>
               <a:rPr lang="en-US" dirty="0" smtClean="0"/>
-              <a:t>clear</a:t>
+              <a:t>z-index</a:t>
             </a:r>
             <a:endParaRPr lang="en-US" dirty="0"/>
           </a:p>
@@ -7136,7 +7250,9 @@
         </p:nvSpPr>
         <p:spPr/>
         <p:txBody>
-          <a:bodyPr/>
+          <a:bodyPr>
+            <a:normAutofit/>
+          </a:bodyPr>
           <a:lstStyle/>
           <a:p>
             <a:r>
@@ -7147,20 +7263,26 @@
               <a:rPr lang="en-US" dirty="0" smtClean="0">
                 <a:hlinkClick r:id="rId2"/>
               </a:rPr>
-              <a:t>http://www.w3.org/TR/CSS21/visuren.html - flow-control</a:t>
+              <a:t>http://www.w3.org/TR/CSS21/visuren.html - z-index</a:t>
             </a:r>
             <a:endParaRPr lang="en-US" dirty="0" smtClean="0"/>
           </a:p>
           <a:p>
             <a:r>
               <a:rPr lang="en-US" dirty="0" smtClean="0"/>
-              <a:t>Clears previous floated elements</a:t>
-            </a:r>
-          </a:p>
-          <a:p>
-            <a:r>
-              <a:rPr lang="en-US" dirty="0" smtClean="0"/>
-              <a:t>Can be none, left, right, both</a:t>
+              <a:t>Sets the "stack level" of a positioned element</a:t>
+            </a:r>
+          </a:p>
+          <a:p>
+            <a:r>
+              <a:rPr lang="en-US" dirty="0" smtClean="0"/>
+              <a:t>Can be auto, integer</a:t>
+            </a:r>
+          </a:p>
+          <a:p>
+            <a:r>
+              <a:rPr lang="en-US" dirty="0" smtClean="0"/>
+              <a:t>Higher numbers are "in front of" lower numbers</a:t>
             </a:r>
           </a:p>
           <a:p>
@@ -7169,7 +7291,7 @@
                 <a:latin typeface="Courier New"/>
                 <a:cs typeface="Courier New"/>
               </a:rPr>
-              <a:t>clear: left;</a:t>
+              <a:t>z-index: 99;</a:t>
             </a:r>
             <a:endParaRPr lang="en-US" sz="2000" dirty="0">
               <a:latin typeface="Courier New"/>
@@ -7211,7 +7333,15 @@
             </a:r>
             <a:r>
               <a:rPr lang="en-US" dirty="0" smtClean="0"/>
-              <a:t>/slides/clear/</a:t>
+              <a:t>/slides/</a:t>
+            </a:r>
+            <a:r>
+              <a:rPr lang="en-US" dirty="0" err="1" smtClean="0"/>
+              <a:t>zindex</a:t>
+            </a:r>
+            <a:r>
+              <a:rPr lang="en-US" dirty="0" smtClean="0"/>
+              <a:t>/</a:t>
             </a:r>
             <a:r>
               <a:rPr lang="en-US" dirty="0" err="1" smtClean="0"/>
@@ -7219,7 +7349,7 @@
             </a:r>
             <a:r>
               <a:rPr lang="en-US" dirty="0" smtClean="0"/>
-              <a:t>  </a:t>
+              <a:t> </a:t>
             </a:r>
             <a:endParaRPr lang="en-US" dirty="0"/>
           </a:p>
@@ -7228,7 +7358,7 @@
     </p:spTree>
     <p:extLst>
       <p:ext uri="{BB962C8B-B14F-4D97-AF65-F5344CB8AC3E}">
-        <p14:creationId xmlns:p14="http://schemas.microsoft.com/office/powerpoint/2010/main" val="3042433382"/>
+        <p14:creationId xmlns:p14="http://schemas.microsoft.com/office/powerpoint/2010/main" val="1765848951"/>
       </p:ext>
     </p:extLst>
   </p:cSld>
@@ -7257,7 +7387,7 @@
       </p:grpSpPr>
       <p:sp>
         <p:nvSpPr>
-          <p:cNvPr id="3" name="Title 2"/>
+          <p:cNvPr id="2" name="Title 1"/>
           <p:cNvSpPr>
             <a:spLocks noGrp="1"/>
           </p:cNvSpPr>
@@ -7272,7 +7402,7 @@
           <a:p>
             <a:r>
               <a:rPr lang="en-US" dirty="0" smtClean="0"/>
-              <a:t>Break</a:t>
+              <a:t>float</a:t>
             </a:r>
             <a:endParaRPr lang="en-US" dirty="0"/>
           </a:p>
@@ -7280,19 +7410,77 @@
       </p:sp>
       <p:sp>
         <p:nvSpPr>
-          <p:cNvPr id="4" name="Text Placeholder 3"/>
-          <p:cNvSpPr>
-            <a:spLocks noGrp="1"/>
-          </p:cNvSpPr>
-          <p:nvPr>
-            <p:ph type="body" idx="1"/>
-          </p:nvPr>
-        </p:nvSpPr>
-        <p:spPr/>
-        <p:txBody>
-          <a:bodyPr/>
-          <a:lstStyle/>
-          <a:p>
+          <p:cNvPr id="3" name="Content Placeholder 2"/>
+          <p:cNvSpPr>
+            <a:spLocks noGrp="1"/>
+          </p:cNvSpPr>
+          <p:nvPr>
+            <p:ph idx="1"/>
+          </p:nvPr>
+        </p:nvSpPr>
+        <p:spPr/>
+        <p:txBody>
+          <a:bodyPr/>
+          <a:lstStyle/>
+          <a:p>
+            <a:r>
+              <a:rPr lang="en-US" dirty="0" smtClean="0"/>
+              <a:t>Learn more: </a:t>
+            </a:r>
+            <a:r>
+              <a:rPr lang="en-US" dirty="0" smtClean="0">
+                <a:hlinkClick r:id="rId2"/>
+              </a:rPr>
+              <a:t>http://www.w3.org/TR/CSS21/visuren.html - propdef-float</a:t>
+            </a:r>
+            <a:endParaRPr lang="en-US" dirty="0" smtClean="0"/>
+          </a:p>
+          <a:p>
+            <a:r>
+              <a:rPr lang="en-US" dirty="0" smtClean="0"/>
+              <a:t>Used to float an element along other elements</a:t>
+            </a:r>
+          </a:p>
+          <a:p>
+            <a:r>
+              <a:rPr lang="en-US" dirty="0" smtClean="0"/>
+              <a:t>Can be left, right, none</a:t>
+            </a:r>
+          </a:p>
+          <a:p>
+            <a:r>
+              <a:rPr lang="en-US" sz="2000" dirty="0" smtClean="0">
+                <a:latin typeface="Courier New"/>
+                <a:cs typeface="Courier New"/>
+              </a:rPr>
+              <a:t>float: left;</a:t>
+            </a:r>
+            <a:endParaRPr lang="en-US" sz="2000" dirty="0">
+              <a:latin typeface="Courier New"/>
+              <a:cs typeface="Courier New"/>
+            </a:endParaRPr>
+          </a:p>
+        </p:txBody>
+      </p:sp>
+      <p:sp>
+        <p:nvSpPr>
+          <p:cNvPr id="4" name="Footer Placeholder 3"/>
+          <p:cNvSpPr>
+            <a:spLocks noGrp="1"/>
+          </p:cNvSpPr>
+          <p:nvPr>
+            <p:ph type="ftr" sz="quarter" idx="11"/>
+          </p:nvPr>
+        </p:nvSpPr>
+        <p:spPr/>
+        <p:txBody>
+          <a:bodyPr/>
+          <a:lstStyle/>
+          <a:p>
+            <a:r>
+              <a:rPr lang="en-US" smtClean="0"/>
+              <a:t>http://dl.dropbox.com/u/41609448/art329/slides/classfive/slides/float/index.html  </a:t>
+            </a:r>
             <a:endParaRPr lang="en-US"/>
           </a:p>
         </p:txBody>
@@ -7300,20 +7488,13 @@
     </p:spTree>
     <p:extLst>
       <p:ext uri="{BB962C8B-B14F-4D97-AF65-F5344CB8AC3E}">
-        <p14:creationId xmlns:p14="http://schemas.microsoft.com/office/powerpoint/2010/main" val="691192380"/>
+        <p14:creationId xmlns:p14="http://schemas.microsoft.com/office/powerpoint/2010/main" val="409718624"/>
       </p:ext>
     </p:extLst>
   </p:cSld>
   <p:clrMapOvr>
     <a:masterClrMapping/>
   </p:clrMapOvr>
-  <p:timing>
-    <p:tnLst>
-      <p:par>
-        <p:cTn xmlns:p14="http://schemas.microsoft.com/office/powerpoint/2010/main" id="1" dur="indefinite" restart="never" nodeType="tmRoot"/>
-      </p:par>
-    </p:tnLst>
-  </p:timing>
 </p:sld>
 </file>
 
@@ -7346,21 +7527,12 @@
         </p:nvSpPr>
         <p:spPr/>
         <p:txBody>
-          <a:bodyPr>
-            <a:normAutofit fontScale="90000"/>
-          </a:bodyPr>
-          <a:lstStyle/>
-          <a:p>
-            <a:r>
-              <a:rPr lang="en-US" dirty="0" smtClean="0"/>
-              <a:t>width,</a:t>
-            </a:r>
-            <a:br>
-              <a:rPr lang="en-US" dirty="0" smtClean="0"/>
-            </a:br>
-            <a:r>
-              <a:rPr lang="en-US" dirty="0" smtClean="0"/>
-              <a:t>min-width, max-width</a:t>
+          <a:bodyPr/>
+          <a:lstStyle/>
+          <a:p>
+            <a:r>
+              <a:rPr lang="en-US" dirty="0" smtClean="0"/>
+              <a:t>clear</a:t>
             </a:r>
             <a:endParaRPr lang="en-US" dirty="0"/>
           </a:p>
@@ -7389,26 +7561,20 @@
               <a:rPr lang="en-US" dirty="0" smtClean="0">
                 <a:hlinkClick r:id="rId2"/>
               </a:rPr>
-              <a:t>http://www.w3.org/TR/CSS21/visudet.html - the-width-property</a:t>
+              <a:t>http://www.w3.org/TR/CSS21/visuren.html - flow-control</a:t>
             </a:r>
             <a:endParaRPr lang="en-US" dirty="0" smtClean="0"/>
           </a:p>
           <a:p>
             <a:r>
               <a:rPr lang="en-US" dirty="0" smtClean="0"/>
-              <a:t>Sets the width of the element</a:t>
-            </a:r>
-          </a:p>
-          <a:p>
-            <a:r>
-              <a:rPr lang="en-US" dirty="0" smtClean="0"/>
-              <a:t>Can also set the minimum width and maximum width</a:t>
-            </a:r>
-          </a:p>
-          <a:p>
-            <a:r>
-              <a:rPr lang="en-US" dirty="0" smtClean="0"/>
-              <a:t>Can be length, %, auto</a:t>
+              <a:t>Clears previous floated elements</a:t>
+            </a:r>
+          </a:p>
+          <a:p>
+            <a:r>
+              <a:rPr lang="en-US" dirty="0" smtClean="0"/>
+              <a:t>Can be none, left, right, both</a:t>
             </a:r>
           </a:p>
           <a:p>
@@ -7417,7 +7583,7 @@
                 <a:latin typeface="Courier New"/>
                 <a:cs typeface="Courier New"/>
               </a:rPr>
-              <a:t>width: 100px; min-width: 50px; max-width: 150px;</a:t>
+              <a:t>clear: left;</a:t>
             </a:r>
             <a:endParaRPr lang="en-US" sz="2000" dirty="0">
               <a:latin typeface="Courier New"/>
@@ -7442,17 +7608,41 @@
           <a:lstStyle/>
           <a:p>
             <a:r>
-              <a:rPr lang="en-US" smtClean="0"/>
-              <a:t>http://dl.dropbox.com/u/41609448/art329/slides/classfive/slides/width/index.html   </a:t>
-            </a:r>
-            <a:endParaRPr lang="en-US"/>
+              <a:rPr lang="en-US" dirty="0" smtClean="0"/>
+              <a:t>http://</a:t>
+            </a:r>
+            <a:r>
+              <a:rPr lang="en-US" dirty="0" err="1" smtClean="0"/>
+              <a:t>dl.dropbox.com</a:t>
+            </a:r>
+            <a:r>
+              <a:rPr lang="en-US" dirty="0" smtClean="0"/>
+              <a:t>/u/41609448/art329/slides/</a:t>
+            </a:r>
+            <a:r>
+              <a:rPr lang="en-US" dirty="0" err="1" smtClean="0"/>
+              <a:t>classfive</a:t>
+            </a:r>
+            <a:r>
+              <a:rPr lang="en-US" dirty="0" smtClean="0"/>
+              <a:t>/slides/clear/</a:t>
+            </a:r>
+            <a:r>
+              <a:rPr lang="en-US" dirty="0" err="1" smtClean="0"/>
+              <a:t>index.html</a:t>
+            </a:r>
+            <a:r>
+              <a:rPr lang="en-US" dirty="0" smtClean="0"/>
+              <a:t>  </a:t>
+            </a:r>
+            <a:endParaRPr lang="en-US" dirty="0"/>
           </a:p>
         </p:txBody>
       </p:sp>
     </p:spTree>
     <p:extLst>
       <p:ext uri="{BB962C8B-B14F-4D97-AF65-F5344CB8AC3E}">
-        <p14:creationId xmlns:p14="http://schemas.microsoft.com/office/powerpoint/2010/main" val="1259737556"/>
+        <p14:creationId xmlns:p14="http://schemas.microsoft.com/office/powerpoint/2010/main" val="3042433382"/>
       </p:ext>
     </p:extLst>
   </p:cSld>
@@ -7481,7 +7671,7 @@
       </p:grpSpPr>
       <p:sp>
         <p:nvSpPr>
-          <p:cNvPr id="2" name="Title 1"/>
+          <p:cNvPr id="3" name="Title 2"/>
           <p:cNvSpPr>
             <a:spLocks noGrp="1"/>
           </p:cNvSpPr>
@@ -7491,21 +7681,12 @@
         </p:nvSpPr>
         <p:spPr/>
         <p:txBody>
-          <a:bodyPr>
-            <a:normAutofit fontScale="90000"/>
-          </a:bodyPr>
-          <a:lstStyle/>
-          <a:p>
-            <a:r>
-              <a:rPr lang="en-US" dirty="0" smtClean="0"/>
-              <a:t>height,</a:t>
-            </a:r>
-            <a:br>
-              <a:rPr lang="en-US" dirty="0" smtClean="0"/>
-            </a:br>
-            <a:r>
-              <a:rPr lang="en-US" dirty="0" smtClean="0"/>
-              <a:t>min-height, max-height</a:t>
+          <a:bodyPr/>
+          <a:lstStyle/>
+          <a:p>
+            <a:r>
+              <a:rPr lang="en-US" dirty="0" smtClean="0"/>
+              <a:t>Break</a:t>
             </a:r>
             <a:endParaRPr lang="en-US" dirty="0"/>
           </a:p>
@@ -7513,121 +7694,40 @@
       </p:sp>
       <p:sp>
         <p:nvSpPr>
-          <p:cNvPr id="3" name="Content Placeholder 2"/>
-          <p:cNvSpPr>
-            <a:spLocks noGrp="1"/>
-          </p:cNvSpPr>
-          <p:nvPr>
-            <p:ph idx="1"/>
-          </p:nvPr>
-        </p:nvSpPr>
-        <p:spPr/>
-        <p:txBody>
-          <a:bodyPr/>
-          <a:lstStyle/>
-          <a:p>
-            <a:r>
-              <a:rPr lang="en-US" dirty="0" smtClean="0"/>
-              <a:t>Learn more: </a:t>
-            </a:r>
-            <a:r>
-              <a:rPr lang="en-US" dirty="0" smtClean="0">
-                <a:hlinkClick r:id="rId2"/>
-              </a:rPr>
-              <a:t>http://www.w3.org/TR/CSS21/visudet.html - the-height-property</a:t>
-            </a:r>
-            <a:endParaRPr lang="en-US" dirty="0" smtClean="0"/>
-          </a:p>
-          <a:p>
-            <a:r>
-              <a:rPr lang="en-US" dirty="0" smtClean="0"/>
-              <a:t>Sets the height of the element</a:t>
-            </a:r>
-          </a:p>
-          <a:p>
-            <a:r>
-              <a:rPr lang="en-US" dirty="0" smtClean="0"/>
-              <a:t>Can also set the minimum height and maximum height</a:t>
-            </a:r>
-          </a:p>
-          <a:p>
-            <a:r>
-              <a:rPr lang="en-US" dirty="0" smtClean="0"/>
-              <a:t>Can be length, %, auto</a:t>
-            </a:r>
-          </a:p>
-          <a:p>
-            <a:r>
-              <a:rPr lang="en-US" sz="2000" dirty="0" smtClean="0">
-                <a:latin typeface="Courier New"/>
-                <a:cs typeface="Courier New"/>
-              </a:rPr>
-              <a:t>height: 100px; min-height: 50px; max-height: 150px;</a:t>
-            </a:r>
-            <a:endParaRPr lang="en-US" sz="2000" dirty="0">
-              <a:latin typeface="Courier New"/>
-              <a:cs typeface="Courier New"/>
-            </a:endParaRPr>
-          </a:p>
-        </p:txBody>
-      </p:sp>
-      <p:sp>
-        <p:nvSpPr>
-          <p:cNvPr id="4" name="Footer Placeholder 3"/>
-          <p:cNvSpPr>
-            <a:spLocks noGrp="1"/>
-          </p:cNvSpPr>
-          <p:nvPr>
-            <p:ph type="ftr" sz="quarter" idx="11"/>
-          </p:nvPr>
-        </p:nvSpPr>
-        <p:spPr/>
-        <p:txBody>
-          <a:bodyPr/>
-          <a:lstStyle/>
-          <a:p>
-            <a:r>
-              <a:rPr lang="en-US" dirty="0" smtClean="0"/>
-              <a:t>http://</a:t>
-            </a:r>
-            <a:r>
-              <a:rPr lang="en-US" dirty="0" err="1" smtClean="0"/>
-              <a:t>dl.dropbox.com</a:t>
-            </a:r>
-            <a:r>
-              <a:rPr lang="en-US" dirty="0" smtClean="0"/>
-              <a:t>/u/41609448/art329/slides/</a:t>
-            </a:r>
-            <a:r>
-              <a:rPr lang="en-US" dirty="0" err="1" smtClean="0"/>
-              <a:t>classfive</a:t>
-            </a:r>
-            <a:r>
-              <a:rPr lang="en-US" dirty="0" smtClean="0"/>
-              <a:t>/slides/height/</a:t>
-            </a:r>
-            <a:r>
-              <a:rPr lang="en-US" dirty="0" err="1" smtClean="0"/>
-              <a:t>index.html</a:t>
-            </a:r>
-            <a:r>
-              <a:rPr lang="en-US" dirty="0" smtClean="0"/>
-              <a:t>   </a:t>
-            </a:r>
-            <a:endParaRPr lang="en-US" dirty="0"/>
+          <p:cNvPr id="4" name="Text Placeholder 3"/>
+          <p:cNvSpPr>
+            <a:spLocks noGrp="1"/>
+          </p:cNvSpPr>
+          <p:nvPr>
+            <p:ph type="body" idx="1"/>
+          </p:nvPr>
+        </p:nvSpPr>
+        <p:spPr/>
+        <p:txBody>
+          <a:bodyPr/>
+          <a:lstStyle/>
+          <a:p>
+            <a:endParaRPr lang="en-US"/>
           </a:p>
         </p:txBody>
       </p:sp>
     </p:spTree>
     <p:extLst>
       <p:ext uri="{BB962C8B-B14F-4D97-AF65-F5344CB8AC3E}">
-        <p14:creationId xmlns:p14="http://schemas.microsoft.com/office/powerpoint/2010/main" val="841147867"/>
+        <p14:creationId xmlns:p14="http://schemas.microsoft.com/office/powerpoint/2010/main" val="691192380"/>
       </p:ext>
     </p:extLst>
   </p:cSld>
   <p:clrMapOvr>
     <a:masterClrMapping/>
   </p:clrMapOvr>
+  <p:timing>
+    <p:tnLst>
+      <p:par>
+        <p:cTn xmlns:p14="http://schemas.microsoft.com/office/powerpoint/2010/main" id="1" dur="indefinite" restart="never" nodeType="tmRoot"/>
+      </p:par>
+    </p:tnLst>
+  </p:timing>
 </p:sld>
 </file>
 
@@ -7660,12 +7760,21 @@
         </p:nvSpPr>
         <p:spPr/>
         <p:txBody>
-          <a:bodyPr/>
-          <a:lstStyle/>
-          <a:p>
-            <a:r>
-              <a:rPr lang="en-US" dirty="0" smtClean="0"/>
-              <a:t>overflow</a:t>
+          <a:bodyPr>
+            <a:normAutofit fontScale="90000"/>
+          </a:bodyPr>
+          <a:lstStyle/>
+          <a:p>
+            <a:r>
+              <a:rPr lang="en-US" dirty="0" smtClean="0"/>
+              <a:t>width,</a:t>
+            </a:r>
+            <a:br>
+              <a:rPr lang="en-US" dirty="0" smtClean="0"/>
+            </a:br>
+            <a:r>
+              <a:rPr lang="en-US" dirty="0" smtClean="0"/>
+              <a:t>min-width, max-width</a:t>
             </a:r>
             <a:endParaRPr lang="en-US" dirty="0"/>
           </a:p>
@@ -7683,9 +7792,7 @@
         </p:nvSpPr>
         <p:spPr/>
         <p:txBody>
-          <a:bodyPr>
-            <a:normAutofit/>
-          </a:bodyPr>
+          <a:bodyPr/>
           <a:lstStyle/>
           <a:p>
             <a:r>
@@ -7696,20 +7803,26 @@
               <a:rPr lang="en-US" dirty="0" smtClean="0">
                 <a:hlinkClick r:id="rId2"/>
               </a:rPr>
-              <a:t>http://www.w3.org/TR/CSS21/visufx.html - propdef-overflow</a:t>
+              <a:t>http://www.w3.org/TR/CSS21/visudet.html - the-width-property</a:t>
             </a:r>
             <a:endParaRPr lang="en-US" dirty="0" smtClean="0"/>
           </a:p>
           <a:p>
             <a:r>
               <a:rPr lang="en-US" dirty="0" smtClean="0"/>
-              <a:t>Handles content that overflows the box</a:t>
-            </a:r>
-          </a:p>
-          <a:p>
-            <a:r>
-              <a:rPr lang="en-US" dirty="0" smtClean="0"/>
-              <a:t>Can be visible, hidden, scroll, auto</a:t>
+              <a:t>Sets the width of the element</a:t>
+            </a:r>
+          </a:p>
+          <a:p>
+            <a:r>
+              <a:rPr lang="en-US" dirty="0" smtClean="0"/>
+              <a:t>Can also set the minimum width and maximum width</a:t>
+            </a:r>
+          </a:p>
+          <a:p>
+            <a:r>
+              <a:rPr lang="en-US" dirty="0" smtClean="0"/>
+              <a:t>Can be length, %, auto</a:t>
             </a:r>
           </a:p>
           <a:p>
@@ -7718,7 +7831,7 @@
                 <a:latin typeface="Courier New"/>
                 <a:cs typeface="Courier New"/>
               </a:rPr>
-              <a:t>overflow: scroll;</a:t>
+              <a:t>width: 100px; min-width: 50px; max-width: 150px;</a:t>
             </a:r>
             <a:endParaRPr lang="en-US" sz="2000" dirty="0">
               <a:latin typeface="Courier New"/>
@@ -7743,37 +7856,17 @@
           <a:lstStyle/>
           <a:p>
             <a:r>
-              <a:rPr lang="en-US" dirty="0" smtClean="0"/>
-              <a:t>http://</a:t>
-            </a:r>
-            <a:r>
-              <a:rPr lang="en-US" dirty="0" err="1" smtClean="0"/>
-              <a:t>dl.dropbox.com</a:t>
-            </a:r>
-            <a:r>
-              <a:rPr lang="en-US" dirty="0" smtClean="0"/>
-              <a:t>/u/41609448/art329/slides/</a:t>
-            </a:r>
-            <a:r>
-              <a:rPr lang="en-US" dirty="0" err="1" smtClean="0"/>
-              <a:t>classfive</a:t>
-            </a:r>
-            <a:r>
-              <a:rPr lang="en-US" dirty="0" smtClean="0"/>
-              <a:t>/slides/overflow/</a:t>
-            </a:r>
-            <a:r>
-              <a:rPr lang="en-US" dirty="0" err="1" smtClean="0"/>
-              <a:t>index.html</a:t>
-            </a:r>
-            <a:endParaRPr lang="en-US" dirty="0"/>
+              <a:rPr lang="en-US" smtClean="0"/>
+              <a:t>http://dl.dropbox.com/u/41609448/art329/slides/classfive/slides/width/index.html   </a:t>
+            </a:r>
+            <a:endParaRPr lang="en-US"/>
           </a:p>
         </p:txBody>
       </p:sp>
     </p:spTree>
     <p:extLst>
       <p:ext uri="{BB962C8B-B14F-4D97-AF65-F5344CB8AC3E}">
-        <p14:creationId xmlns:p14="http://schemas.microsoft.com/office/powerpoint/2010/main" val="754560617"/>
+        <p14:creationId xmlns:p14="http://schemas.microsoft.com/office/powerpoint/2010/main" val="1259737556"/>
       </p:ext>
     </p:extLst>
   </p:cSld>
@@ -7812,12 +7905,21 @@
         </p:nvSpPr>
         <p:spPr/>
         <p:txBody>
-          <a:bodyPr/>
-          <a:lstStyle/>
-          <a:p>
-            <a:r>
-              <a:rPr lang="en-US" dirty="0" smtClean="0"/>
-              <a:t>vertical-align</a:t>
+          <a:bodyPr>
+            <a:normAutofit fontScale="90000"/>
+          </a:bodyPr>
+          <a:lstStyle/>
+          <a:p>
+            <a:r>
+              <a:rPr lang="en-US" dirty="0" smtClean="0"/>
+              <a:t>height,</a:t>
+            </a:r>
+            <a:br>
+              <a:rPr lang="en-US" dirty="0" smtClean="0"/>
+            </a:br>
+            <a:r>
+              <a:rPr lang="en-US" dirty="0" smtClean="0"/>
+              <a:t>min-height, max-height</a:t>
             </a:r>
             <a:endParaRPr lang="en-US" dirty="0"/>
           </a:p>
@@ -7846,36 +7948,26 @@
               <a:rPr lang="en-US" dirty="0" smtClean="0">
                 <a:hlinkClick r:id="rId2"/>
               </a:rPr>
-              <a:t>http://www.w3.org/TR/CSS21/visudet.html - propdef-vertical-align</a:t>
+              <a:t>http://www.w3.org/TR/CSS21/visudet.html - the-height-property</a:t>
             </a:r>
             <a:endParaRPr lang="en-US" dirty="0" smtClean="0"/>
           </a:p>
           <a:p>
             <a:r>
               <a:rPr lang="en-US" dirty="0" smtClean="0"/>
-              <a:t>Sets the vertical positioning for inline boxes</a:t>
-            </a:r>
-          </a:p>
-          <a:p>
-            <a:r>
-              <a:rPr lang="en-US" dirty="0" smtClean="0"/>
-              <a:t>Can be baseline, sub, super, top, </a:t>
-            </a:r>
-            <a:r>
-              <a:rPr lang="en-US" dirty="0"/>
-              <a:t>text-</a:t>
-            </a:r>
-            <a:r>
-              <a:rPr lang="en-US" dirty="0" smtClean="0"/>
-              <a:t>top, middle, bottom, text</a:t>
-            </a:r>
-            <a:r>
-              <a:rPr lang="en-US" dirty="0"/>
-              <a:t>-</a:t>
-            </a:r>
-            <a:r>
-              <a:rPr lang="en-US" dirty="0" smtClean="0"/>
-              <a:t>bottom, %, length</a:t>
+              <a:t>Sets the height of the element</a:t>
+            </a:r>
+          </a:p>
+          <a:p>
+            <a:r>
+              <a:rPr lang="en-US" dirty="0" smtClean="0"/>
+              <a:t>Can also set the minimum height and maximum height</a:t>
+            </a:r>
+          </a:p>
+          <a:p>
+            <a:r>
+              <a:rPr lang="en-US" dirty="0" smtClean="0"/>
+              <a:t>Can be length, %, auto</a:t>
             </a:r>
           </a:p>
           <a:p>
@@ -7884,7 +7976,7 @@
                 <a:latin typeface="Courier New"/>
                 <a:cs typeface="Courier New"/>
               </a:rPr>
-              <a:t>vertical-align: top;</a:t>
+              <a:t>height: 100px; min-height: 50px; max-height: 150px;</a:t>
             </a:r>
             <a:endParaRPr lang="en-US" sz="2000" dirty="0">
               <a:latin typeface="Courier New"/>
@@ -7909,17 +8001,41 @@
           <a:lstStyle/>
           <a:p>
             <a:r>
-              <a:rPr lang="en-US" smtClean="0"/>
-              <a:t>http://dl.dropbox.com/u/41609448/art329/slides/classfive/slides/verticalalign/index.html</a:t>
-            </a:r>
-            <a:endParaRPr lang="en-US"/>
+              <a:rPr lang="en-US" dirty="0" smtClean="0"/>
+              <a:t>http://</a:t>
+            </a:r>
+            <a:r>
+              <a:rPr lang="en-US" dirty="0" err="1" smtClean="0"/>
+              <a:t>dl.dropbox.com</a:t>
+            </a:r>
+            <a:r>
+              <a:rPr lang="en-US" dirty="0" smtClean="0"/>
+              <a:t>/u/41609448/art329/slides/</a:t>
+            </a:r>
+            <a:r>
+              <a:rPr lang="en-US" dirty="0" err="1" smtClean="0"/>
+              <a:t>classfive</a:t>
+            </a:r>
+            <a:r>
+              <a:rPr lang="en-US" dirty="0" smtClean="0"/>
+              <a:t>/slides/height/</a:t>
+            </a:r>
+            <a:r>
+              <a:rPr lang="en-US" dirty="0" err="1" smtClean="0"/>
+              <a:t>index.html</a:t>
+            </a:r>
+            <a:r>
+              <a:rPr lang="en-US" dirty="0" smtClean="0"/>
+              <a:t>   </a:t>
+            </a:r>
+            <a:endParaRPr lang="en-US" dirty="0"/>
           </a:p>
         </p:txBody>
       </p:sp>
     </p:spTree>
     <p:extLst>
       <p:ext uri="{BB962C8B-B14F-4D97-AF65-F5344CB8AC3E}">
-        <p14:creationId xmlns:p14="http://schemas.microsoft.com/office/powerpoint/2010/main" val="508701135"/>
+        <p14:creationId xmlns:p14="http://schemas.microsoft.com/office/powerpoint/2010/main" val="841147867"/>
       </p:ext>
     </p:extLst>
   </p:cSld>
@@ -7990,8 +8106,9 @@
             </a:pPr>
             <a:r>
               <a:rPr lang="en-US" dirty="0" smtClean="0"/>
-              <a:t>What's new?</a:t>
-            </a:r>
+              <a:t>Review</a:t>
+            </a:r>
+            <a:endParaRPr lang="en-US" dirty="0" smtClean="0"/>
           </a:p>
           <a:p>
             <a:pPr>
@@ -8098,7 +8215,7 @@
           <a:p>
             <a:r>
               <a:rPr lang="en-US" dirty="0" smtClean="0"/>
-              <a:t>padding</a:t>
+              <a:t>overflow</a:t>
             </a:r>
             <a:endParaRPr lang="en-US" dirty="0"/>
           </a:p>
@@ -8129,26 +8246,20 @@
               <a:rPr lang="en-US" dirty="0" smtClean="0">
                 <a:hlinkClick r:id="rId2"/>
               </a:rPr>
-              <a:t>http://www.w3.org/TR/CSS21/box.html - propdef-padding</a:t>
+              <a:t>http://www.w3.org/TR/CSS21/visufx.html - propdef-overflow</a:t>
             </a:r>
             <a:endParaRPr lang="en-US" dirty="0" smtClean="0"/>
           </a:p>
           <a:p>
             <a:r>
               <a:rPr lang="en-US" dirty="0" smtClean="0"/>
-              <a:t>Pads the inside of an element</a:t>
-            </a:r>
-          </a:p>
-          <a:p>
-            <a:r>
-              <a:rPr lang="en-US" dirty="0" smtClean="0"/>
-              <a:t>Can be a length, %</a:t>
-            </a:r>
-          </a:p>
-          <a:p>
-            <a:r>
-              <a:rPr lang="en-US" dirty="0" smtClean="0"/>
-              <a:t>Use "clock" shorthand or use padding-top, padding-right, padding-bottom, padding-left</a:t>
+              <a:t>Handles content that overflows the box</a:t>
+            </a:r>
+          </a:p>
+          <a:p>
+            <a:r>
+              <a:rPr lang="en-US" dirty="0" smtClean="0"/>
+              <a:t>Can be visible, hidden, scroll, auto</a:t>
             </a:r>
           </a:p>
           <a:p>
@@ -8157,7 +8268,7 @@
                 <a:latin typeface="Courier New"/>
                 <a:cs typeface="Courier New"/>
               </a:rPr>
-              <a:t>padding: 8px;</a:t>
+              <a:t>overflow: scroll;</a:t>
             </a:r>
             <a:endParaRPr lang="en-US" sz="2000" dirty="0">
               <a:latin typeface="Courier New"/>
@@ -8182,17 +8293,37 @@
           <a:lstStyle/>
           <a:p>
             <a:r>
-              <a:rPr lang="en-US" smtClean="0"/>
-              <a:t>http://dl.dropbox.com/u/41609448/art329/slides/classfive/slides/padding/index.html</a:t>
-            </a:r>
-            <a:endParaRPr lang="en-US"/>
+              <a:rPr lang="en-US" dirty="0" smtClean="0"/>
+              <a:t>http://</a:t>
+            </a:r>
+            <a:r>
+              <a:rPr lang="en-US" dirty="0" err="1" smtClean="0"/>
+              <a:t>dl.dropbox.com</a:t>
+            </a:r>
+            <a:r>
+              <a:rPr lang="en-US" dirty="0" smtClean="0"/>
+              <a:t>/u/41609448/art329/slides/</a:t>
+            </a:r>
+            <a:r>
+              <a:rPr lang="en-US" dirty="0" err="1" smtClean="0"/>
+              <a:t>classfive</a:t>
+            </a:r>
+            <a:r>
+              <a:rPr lang="en-US" dirty="0" smtClean="0"/>
+              <a:t>/slides/overflow/</a:t>
+            </a:r>
+            <a:r>
+              <a:rPr lang="en-US" dirty="0" err="1" smtClean="0"/>
+              <a:t>index.html</a:t>
+            </a:r>
+            <a:endParaRPr lang="en-US" dirty="0"/>
           </a:p>
         </p:txBody>
       </p:sp>
     </p:spTree>
     <p:extLst>
       <p:ext uri="{BB962C8B-B14F-4D97-AF65-F5344CB8AC3E}">
-        <p14:creationId xmlns:p14="http://schemas.microsoft.com/office/powerpoint/2010/main" val="616782289"/>
+        <p14:creationId xmlns:p14="http://schemas.microsoft.com/office/powerpoint/2010/main" val="754560617"/>
       </p:ext>
     </p:extLst>
   </p:cSld>
@@ -8236,7 +8367,7 @@
           <a:p>
             <a:r>
               <a:rPr lang="en-US" dirty="0" smtClean="0"/>
-              <a:t>"Clock" Shorthand</a:t>
+              <a:t>vertical-align</a:t>
             </a:r>
             <a:endParaRPr lang="en-US" dirty="0"/>
           </a:p>
@@ -8254,125 +8385,91 @@
         </p:nvSpPr>
         <p:spPr/>
         <p:txBody>
-          <a:bodyPr>
-            <a:normAutofit lnSpcReduction="10000"/>
-          </a:bodyPr>
-          <a:lstStyle/>
-          <a:p>
-            <a:r>
-              <a:rPr lang="en-US" dirty="0" smtClean="0"/>
-              <a:t>Goes clockwise</a:t>
-            </a:r>
-          </a:p>
-          <a:p>
-            <a:r>
-              <a:rPr lang="en-US" dirty="0" smtClean="0"/>
-              <a:t>Used by padding, margin, and border</a:t>
-            </a:r>
-          </a:p>
-          <a:p>
-            <a:r>
-              <a:rPr lang="en-US" dirty="0" smtClean="0"/>
-              <a:t>1 value: applies to all sides</a:t>
-            </a:r>
-          </a:p>
-          <a:p>
-            <a:r>
-              <a:rPr lang="en-US" dirty="0" smtClean="0"/>
-              <a:t>2 values: 1</a:t>
-            </a:r>
-            <a:r>
-              <a:rPr lang="en-US" baseline="30000" dirty="0" smtClean="0"/>
-              <a:t>st</a:t>
-            </a:r>
-            <a:r>
-              <a:rPr lang="en-US" dirty="0" smtClean="0"/>
-              <a:t> number is top/bottom, 2</a:t>
-            </a:r>
-            <a:r>
-              <a:rPr lang="en-US" baseline="30000" dirty="0" smtClean="0"/>
-              <a:t>nd</a:t>
-            </a:r>
-            <a:r>
-              <a:rPr lang="en-US" dirty="0" smtClean="0"/>
-              <a:t> is right/left</a:t>
-            </a:r>
-          </a:p>
-          <a:p>
-            <a:r>
-              <a:rPr lang="en-US" dirty="0" smtClean="0"/>
-              <a:t>3 values: 1</a:t>
-            </a:r>
-            <a:r>
-              <a:rPr lang="en-US" baseline="30000" dirty="0" smtClean="0"/>
-              <a:t>st</a:t>
-            </a:r>
-            <a:r>
-              <a:rPr lang="en-US" dirty="0" smtClean="0"/>
-              <a:t> number is top, 2</a:t>
-            </a:r>
-            <a:r>
-              <a:rPr lang="en-US" baseline="30000" dirty="0" smtClean="0"/>
-              <a:t>nd</a:t>
-            </a:r>
-            <a:r>
-              <a:rPr lang="en-US" dirty="0" smtClean="0"/>
-              <a:t> is right/left, 3</a:t>
-            </a:r>
-            <a:r>
-              <a:rPr lang="en-US" baseline="30000" dirty="0" smtClean="0"/>
-              <a:t>rd</a:t>
-            </a:r>
-            <a:r>
-              <a:rPr lang="en-US" dirty="0" smtClean="0"/>
-              <a:t> is bottom</a:t>
-            </a:r>
-          </a:p>
-          <a:p>
-            <a:r>
-              <a:rPr lang="en-US" dirty="0" smtClean="0"/>
-              <a:t>4 values: 1</a:t>
-            </a:r>
-            <a:r>
-              <a:rPr lang="en-US" baseline="30000" dirty="0" smtClean="0"/>
-              <a:t>st</a:t>
-            </a:r>
-            <a:r>
-              <a:rPr lang="en-US" dirty="0" smtClean="0"/>
-              <a:t> number is top, 2</a:t>
-            </a:r>
-            <a:r>
-              <a:rPr lang="en-US" baseline="30000" dirty="0" smtClean="0"/>
-              <a:t>nd</a:t>
-            </a:r>
-            <a:r>
-              <a:rPr lang="en-US" dirty="0" smtClean="0"/>
-              <a:t> is right, 3</a:t>
-            </a:r>
-            <a:r>
-              <a:rPr lang="en-US" baseline="30000" dirty="0" smtClean="0"/>
-              <a:t>rd</a:t>
-            </a:r>
-            <a:r>
-              <a:rPr lang="en-US" dirty="0" smtClean="0"/>
-              <a:t> is bottom, 4</a:t>
-            </a:r>
-            <a:r>
-              <a:rPr lang="en-US" baseline="30000" dirty="0" smtClean="0"/>
-              <a:t>th</a:t>
-            </a:r>
-            <a:r>
-              <a:rPr lang="en-US" dirty="0" smtClean="0"/>
-              <a:t> is left</a:t>
-            </a:r>
-            <a:endParaRPr lang="en-US" dirty="0"/>
+          <a:bodyPr/>
+          <a:lstStyle/>
+          <a:p>
+            <a:r>
+              <a:rPr lang="en-US" dirty="0" smtClean="0"/>
+              <a:t>Learn more: </a:t>
+            </a:r>
+            <a:r>
+              <a:rPr lang="en-US" dirty="0" smtClean="0">
+                <a:hlinkClick r:id="rId2"/>
+              </a:rPr>
+              <a:t>http://www.w3.org/TR/CSS21/visudet.html - propdef-vertical-align</a:t>
+            </a:r>
+            <a:endParaRPr lang="en-US" dirty="0" smtClean="0"/>
+          </a:p>
+          <a:p>
+            <a:r>
+              <a:rPr lang="en-US" dirty="0" smtClean="0"/>
+              <a:t>Sets the vertical positioning for inline boxes</a:t>
+            </a:r>
+          </a:p>
+          <a:p>
+            <a:r>
+              <a:rPr lang="en-US" dirty="0" smtClean="0"/>
+              <a:t>Can be baseline, sub, super, top, </a:t>
+            </a:r>
+            <a:r>
+              <a:rPr lang="en-US" dirty="0"/>
+              <a:t>text-</a:t>
+            </a:r>
+            <a:r>
+              <a:rPr lang="en-US" dirty="0" smtClean="0"/>
+              <a:t>top, middle, bottom, text</a:t>
+            </a:r>
+            <a:r>
+              <a:rPr lang="en-US" dirty="0"/>
+              <a:t>-</a:t>
+            </a:r>
+            <a:r>
+              <a:rPr lang="en-US" dirty="0" smtClean="0"/>
+              <a:t>bottom, %, length</a:t>
+            </a:r>
+          </a:p>
+          <a:p>
+            <a:r>
+              <a:rPr lang="en-US" sz="2000" dirty="0" smtClean="0">
+                <a:latin typeface="Courier New"/>
+                <a:cs typeface="Courier New"/>
+              </a:rPr>
+              <a:t>vertical-align: top;</a:t>
+            </a:r>
+            <a:endParaRPr lang="en-US" sz="2000" dirty="0">
+              <a:latin typeface="Courier New"/>
+              <a:cs typeface="Courier New"/>
+            </a:endParaRPr>
+          </a:p>
+        </p:txBody>
+      </p:sp>
+      <p:sp>
+        <p:nvSpPr>
+          <p:cNvPr id="4" name="Footer Placeholder 3"/>
+          <p:cNvSpPr>
+            <a:spLocks noGrp="1"/>
+          </p:cNvSpPr>
+          <p:nvPr>
+            <p:ph type="ftr" sz="quarter" idx="11"/>
+          </p:nvPr>
+        </p:nvSpPr>
+        <p:spPr/>
+        <p:txBody>
+          <a:bodyPr/>
+          <a:lstStyle/>
+          <a:p>
+            <a:r>
+              <a:rPr lang="en-US" smtClean="0"/>
+              <a:t>http://dl.dropbox.com/u/41609448/art329/slides/classfive/slides/verticalalign/index.html</a:t>
+            </a:r>
+            <a:endParaRPr lang="en-US"/>
           </a:p>
         </p:txBody>
       </p:sp>
     </p:spTree>
     <p:extLst>
       <p:ext uri="{BB962C8B-B14F-4D97-AF65-F5344CB8AC3E}">
-        <p14:creationId xmlns:p14="http://schemas.microsoft.com/office/powerpoint/2010/main" val="3689856785"/>
+        <p14:creationId xmlns:p14="http://schemas.microsoft.com/office/powerpoint/2010/main" val="508701135"/>
       </p:ext>
     </p:extLst>
   </p:cSld>
@@ -8416,7 +8513,7 @@
           <a:p>
             <a:r>
               <a:rPr lang="en-US" dirty="0" smtClean="0"/>
-              <a:t>border</a:t>
+              <a:t>padding</a:t>
             </a:r>
             <a:endParaRPr lang="en-US" dirty="0"/>
           </a:p>
@@ -8447,48 +8544,26 @@
               <a:rPr lang="en-US" dirty="0" smtClean="0">
                 <a:hlinkClick r:id="rId2"/>
               </a:rPr>
-              <a:t>http://www.w3.org/TR/CSS21/box.html - border-properties</a:t>
+              <a:t>http://www.w3.org/TR/CSS21/box.html - propdef-padding</a:t>
             </a:r>
             <a:endParaRPr lang="en-US" dirty="0" smtClean="0"/>
           </a:p>
           <a:p>
             <a:r>
               <a:rPr lang="en-US" dirty="0" smtClean="0"/>
-              <a:t>Sets the border properties: width, style, color</a:t>
-            </a:r>
-          </a:p>
-          <a:p>
-            <a:r>
-              <a:rPr lang="en-US" dirty="0"/>
-              <a:t>Use "clock" shorthand or use border-</a:t>
-            </a:r>
-            <a:r>
-              <a:rPr lang="en-US" dirty="0" smtClean="0"/>
-              <a:t>top, </a:t>
-            </a:r>
-            <a:r>
-              <a:rPr lang="en-US" dirty="0"/>
-              <a:t>border-</a:t>
-            </a:r>
-            <a:r>
-              <a:rPr lang="en-US" dirty="0" smtClean="0"/>
-              <a:t>right, </a:t>
-            </a:r>
-            <a:r>
-              <a:rPr lang="en-US" dirty="0"/>
-              <a:t>border-</a:t>
-            </a:r>
-            <a:r>
-              <a:rPr lang="en-US" dirty="0" smtClean="0"/>
-              <a:t>bottom, </a:t>
-            </a:r>
-            <a:r>
-              <a:rPr lang="en-US" dirty="0"/>
-              <a:t>border-</a:t>
-            </a:r>
-            <a:r>
-              <a:rPr lang="en-US" dirty="0" smtClean="0"/>
-              <a:t>left</a:t>
+              <a:t>Pads the inside of an element</a:t>
+            </a:r>
+          </a:p>
+          <a:p>
+            <a:r>
+              <a:rPr lang="en-US" dirty="0" smtClean="0"/>
+              <a:t>Can be a length, %</a:t>
+            </a:r>
+          </a:p>
+          <a:p>
+            <a:r>
+              <a:rPr lang="en-US" dirty="0" smtClean="0"/>
+              <a:t>Use "clock" shorthand or use padding-top, padding-right, padding-bottom, padding-left</a:t>
             </a:r>
           </a:p>
           <a:p>
@@ -8497,7 +8572,7 @@
                 <a:latin typeface="Courier New"/>
                 <a:cs typeface="Courier New"/>
               </a:rPr>
-              <a:t>border: 1px solid #000;</a:t>
+              <a:t>padding: 8px;</a:t>
             </a:r>
             <a:endParaRPr lang="en-US" sz="2000" dirty="0">
               <a:latin typeface="Courier New"/>
@@ -8522,37 +8597,17 @@
           <a:lstStyle/>
           <a:p>
             <a:r>
-              <a:rPr lang="en-US" dirty="0" smtClean="0"/>
-              <a:t>http://</a:t>
-            </a:r>
-            <a:r>
-              <a:rPr lang="en-US" dirty="0" err="1" smtClean="0"/>
-              <a:t>dl.dropbox.com</a:t>
-            </a:r>
-            <a:r>
-              <a:rPr lang="en-US" dirty="0" smtClean="0"/>
-              <a:t>/u/41609448/art329/slides/</a:t>
-            </a:r>
-            <a:r>
-              <a:rPr lang="en-US" dirty="0" err="1" smtClean="0"/>
-              <a:t>classfour</a:t>
-            </a:r>
-            <a:r>
-              <a:rPr lang="en-US" dirty="0" smtClean="0"/>
-              <a:t>/slides/border/</a:t>
-            </a:r>
-            <a:r>
-              <a:rPr lang="en-US" dirty="0" err="1" smtClean="0"/>
-              <a:t>index.html</a:t>
-            </a:r>
-            <a:endParaRPr lang="en-US" dirty="0"/>
+              <a:rPr lang="en-US" smtClean="0"/>
+              <a:t>http://dl.dropbox.com/u/41609448/art329/slides/classfive/slides/padding/index.html</a:t>
+            </a:r>
+            <a:endParaRPr lang="en-US"/>
           </a:p>
         </p:txBody>
       </p:sp>
     </p:spTree>
     <p:extLst>
       <p:ext uri="{BB962C8B-B14F-4D97-AF65-F5344CB8AC3E}">
-        <p14:creationId xmlns:p14="http://schemas.microsoft.com/office/powerpoint/2010/main" val="3192035239"/>
+        <p14:creationId xmlns:p14="http://schemas.microsoft.com/office/powerpoint/2010/main" val="616782289"/>
       </p:ext>
     </p:extLst>
   </p:cSld>
@@ -8596,7 +8651,7 @@
           <a:p>
             <a:r>
               <a:rPr lang="en-US" dirty="0" smtClean="0"/>
-              <a:t>border-width</a:t>
+              <a:t>"Clock" Shorthand</a:t>
             </a:r>
             <a:endParaRPr lang="en-US" dirty="0"/>
           </a:p>
@@ -8615,156 +8670,115 @@
         <p:spPr/>
         <p:txBody>
           <a:bodyPr>
-            <a:normAutofit/>
+            <a:normAutofit lnSpcReduction="10000"/>
           </a:bodyPr>
           <a:lstStyle/>
           <a:p>
             <a:r>
               <a:rPr lang="en-US" dirty="0" smtClean="0"/>
-              <a:t>Learn more: </a:t>
-            </a:r>
-            <a:r>
-              <a:rPr lang="en-US" dirty="0" smtClean="0">
-                <a:hlinkClick r:id="rId2"/>
-              </a:rPr>
-              <a:t>http://www.w3.org/TR/CSS21/box.html - propdef-border-top-width</a:t>
-            </a:r>
-            <a:endParaRPr lang="en-US" dirty="0" smtClean="0"/>
-          </a:p>
-          <a:p>
-            <a:r>
-              <a:rPr lang="en-US" dirty="0" smtClean="0"/>
-              <a:t>Sets the border width</a:t>
-            </a:r>
-          </a:p>
-          <a:p>
-            <a:r>
-              <a:rPr lang="en-US" dirty="0" smtClean="0"/>
-              <a:t>Can be thin, medium, thick, length</a:t>
-            </a:r>
-          </a:p>
-          <a:p>
-            <a:r>
-              <a:rPr lang="en-US" dirty="0"/>
-              <a:t>Use </a:t>
-            </a:r>
-            <a:r>
-              <a:rPr lang="en-US" dirty="0" smtClean="0"/>
-              <a:t>"clock" shorthand </a:t>
-            </a:r>
-            <a:r>
-              <a:rPr lang="en-US" dirty="0"/>
-              <a:t>or use </a:t>
-            </a:r>
-            <a:r>
-              <a:rPr lang="en-US" dirty="0" smtClean="0"/>
-              <a:t>border-top-width, </a:t>
-            </a:r>
-            <a:r>
-              <a:rPr lang="en-US" dirty="0"/>
-              <a:t>border</a:t>
-            </a:r>
-            <a:r>
-              <a:rPr lang="en-US" dirty="0" smtClean="0"/>
-              <a:t>-right-</a:t>
-            </a:r>
-            <a:r>
-              <a:rPr lang="en-US" dirty="0"/>
-              <a:t>width</a:t>
-            </a:r>
-            <a:r>
-              <a:rPr lang="en-US" dirty="0" smtClean="0"/>
-              <a:t>, </a:t>
-            </a:r>
-            <a:r>
-              <a:rPr lang="en-US" dirty="0"/>
-              <a:t>border</a:t>
-            </a:r>
-            <a:r>
-              <a:rPr lang="en-US" dirty="0" smtClean="0"/>
-              <a:t>-bottom-</a:t>
-            </a:r>
-            <a:r>
-              <a:rPr lang="en-US" dirty="0"/>
-              <a:t>width</a:t>
-            </a:r>
-            <a:r>
-              <a:rPr lang="en-US" dirty="0" smtClean="0"/>
-              <a:t>, </a:t>
-            </a:r>
-            <a:r>
-              <a:rPr lang="en-US" dirty="0"/>
-              <a:t>border</a:t>
-            </a:r>
-            <a:r>
-              <a:rPr lang="en-US" dirty="0" smtClean="0"/>
-              <a:t>-left-</a:t>
-            </a:r>
-            <a:r>
-              <a:rPr lang="en-US" dirty="0"/>
-              <a:t>width</a:t>
-            </a:r>
-          </a:p>
-          <a:p>
-            <a:r>
-              <a:rPr lang="en-US" sz="2000" dirty="0">
-                <a:latin typeface="Courier New"/>
-                <a:cs typeface="Courier New"/>
-              </a:rPr>
-              <a:t>b</a:t>
-            </a:r>
-            <a:r>
-              <a:rPr lang="en-US" sz="2000" dirty="0" smtClean="0">
-                <a:latin typeface="Courier New"/>
-                <a:cs typeface="Courier New"/>
-              </a:rPr>
-              <a:t>order-width: medium;</a:t>
-            </a:r>
-          </a:p>
-        </p:txBody>
-      </p:sp>
-      <p:sp>
-        <p:nvSpPr>
-          <p:cNvPr id="4" name="Footer Placeholder 3"/>
-          <p:cNvSpPr>
-            <a:spLocks noGrp="1"/>
-          </p:cNvSpPr>
-          <p:nvPr>
-            <p:ph type="ftr" sz="quarter" idx="11"/>
-          </p:nvPr>
-        </p:nvSpPr>
-        <p:spPr/>
-        <p:txBody>
-          <a:bodyPr/>
-          <a:lstStyle/>
-          <a:p>
-            <a:r>
-              <a:rPr lang="en-US" dirty="0" smtClean="0"/>
-              <a:t>http://</a:t>
-            </a:r>
-            <a:r>
-              <a:rPr lang="en-US" dirty="0" err="1" smtClean="0"/>
-              <a:t>dl.dropbox.com</a:t>
-            </a:r>
-            <a:r>
-              <a:rPr lang="en-US" dirty="0" smtClean="0"/>
-              <a:t>/u/41609448/art329/slides/</a:t>
-            </a:r>
-            <a:r>
-              <a:rPr lang="en-US" dirty="0" err="1" smtClean="0"/>
-              <a:t>classfour</a:t>
-            </a:r>
-            <a:r>
-              <a:rPr lang="en-US" dirty="0" smtClean="0"/>
-              <a:t>/slides/border/</a:t>
-            </a:r>
-            <a:r>
-              <a:rPr lang="en-US" dirty="0" err="1" smtClean="0"/>
-              <a:t>index.html</a:t>
-            </a:r>
-            <a:r>
-              <a:rPr lang="en-US" dirty="0" smtClean="0"/>
-              <a:t> </a:t>
+              <a:t>Goes clockwise</a:t>
+            </a:r>
+          </a:p>
+          <a:p>
+            <a:r>
+              <a:rPr lang="en-US" dirty="0" smtClean="0"/>
+              <a:t>Used by padding, margin, and border</a:t>
+            </a:r>
+          </a:p>
+          <a:p>
+            <a:r>
+              <a:rPr lang="en-US" dirty="0" smtClean="0"/>
+              <a:t>1 value: applies to all sides</a:t>
+            </a:r>
+          </a:p>
+          <a:p>
+            <a:r>
+              <a:rPr lang="en-US" dirty="0" smtClean="0"/>
+              <a:t>2 values: 1</a:t>
+            </a:r>
+            <a:r>
+              <a:rPr lang="en-US" baseline="30000" dirty="0" smtClean="0"/>
+              <a:t>st</a:t>
+            </a:r>
+            <a:r>
+              <a:rPr lang="en-US" dirty="0" smtClean="0"/>
+              <a:t> number is top/bottom, 2</a:t>
+            </a:r>
+            <a:r>
+              <a:rPr lang="en-US" baseline="30000" dirty="0" smtClean="0"/>
+              <a:t>nd</a:t>
+            </a:r>
+            <a:r>
+              <a:rPr lang="en-US" dirty="0" smtClean="0"/>
+              <a:t> is right/left</a:t>
+            </a:r>
+          </a:p>
+          <a:p>
+            <a:r>
+              <a:rPr lang="en-US" dirty="0" smtClean="0"/>
+              <a:t>3 values: 1</a:t>
+            </a:r>
+            <a:r>
+              <a:rPr lang="en-US" baseline="30000" dirty="0" smtClean="0"/>
+              <a:t>st</a:t>
+            </a:r>
+            <a:r>
+              <a:rPr lang="en-US" dirty="0" smtClean="0"/>
+              <a:t> number is top, 2</a:t>
+            </a:r>
+            <a:r>
+              <a:rPr lang="en-US" baseline="30000" dirty="0" smtClean="0"/>
+              <a:t>nd</a:t>
+            </a:r>
+            <a:r>
+              <a:rPr lang="en-US" dirty="0" smtClean="0"/>
+              <a:t> is right/left, 3</a:t>
+            </a:r>
+            <a:r>
+              <a:rPr lang="en-US" baseline="30000" dirty="0" smtClean="0"/>
+              <a:t>rd</a:t>
+            </a:r>
+            <a:r>
+              <a:rPr lang="en-US" dirty="0" smtClean="0"/>
+              <a:t> is bottom</a:t>
+            </a:r>
+          </a:p>
+          <a:p>
+            <a:r>
+              <a:rPr lang="en-US" dirty="0" smtClean="0"/>
+              <a:t>4 values: 1</a:t>
+            </a:r>
+            <a:r>
+              <a:rPr lang="en-US" baseline="30000" dirty="0" smtClean="0"/>
+              <a:t>st</a:t>
+            </a:r>
+            <a:r>
+              <a:rPr lang="en-US" dirty="0" smtClean="0"/>
+              <a:t> number is top, 2</a:t>
+            </a:r>
+            <a:r>
+              <a:rPr lang="en-US" baseline="30000" dirty="0" smtClean="0"/>
+              <a:t>nd</a:t>
+            </a:r>
+            <a:r>
+              <a:rPr lang="en-US" dirty="0" smtClean="0"/>
+              <a:t> is right, 3</a:t>
+            </a:r>
+            <a:r>
+              <a:rPr lang="en-US" baseline="30000" dirty="0" smtClean="0"/>
+              <a:t>rd</a:t>
+            </a:r>
+            <a:r>
+              <a:rPr lang="en-US" dirty="0" smtClean="0"/>
+              <a:t> is bottom, 4</a:t>
+            </a:r>
+            <a:r>
+              <a:rPr lang="en-US" baseline="30000" dirty="0" smtClean="0"/>
+              <a:t>th</a:t>
+            </a:r>
+            <a:r>
+              <a:rPr lang="en-US" dirty="0" smtClean="0"/>
+              <a:t> is left</a:t>
             </a:r>
             <a:endParaRPr lang="en-US" dirty="0"/>
           </a:p>
@@ -8773,7 +8787,7 @@
     </p:spTree>
     <p:extLst>
       <p:ext uri="{BB962C8B-B14F-4D97-AF65-F5344CB8AC3E}">
-        <p14:creationId xmlns:p14="http://schemas.microsoft.com/office/powerpoint/2010/main" val="3601305251"/>
+        <p14:creationId xmlns:p14="http://schemas.microsoft.com/office/powerpoint/2010/main" val="3689856785"/>
       </p:ext>
     </p:extLst>
   </p:cSld>
@@ -8817,7 +8831,7 @@
           <a:p>
             <a:r>
               <a:rPr lang="en-US" dirty="0" smtClean="0"/>
-              <a:t>border-color</a:t>
+              <a:t>border</a:t>
             </a:r>
             <a:endParaRPr lang="en-US" dirty="0"/>
           </a:p>
@@ -8848,80 +8862,62 @@
               <a:rPr lang="en-US" dirty="0" smtClean="0">
                 <a:hlinkClick r:id="rId2"/>
               </a:rPr>
-              <a:t>http://www.w3.org/TR/CSS21/box.html - propdef-border-top-color</a:t>
+              <a:t>http://www.w3.org/TR/CSS21/box.html - border-properties</a:t>
             </a:r>
             <a:endParaRPr lang="en-US" dirty="0" smtClean="0"/>
           </a:p>
           <a:p>
             <a:r>
               <a:rPr lang="en-US" dirty="0" smtClean="0"/>
-              <a:t>Sets the border color</a:t>
-            </a:r>
-          </a:p>
-          <a:p>
-            <a:r>
-              <a:rPr lang="en-US" dirty="0" smtClean="0"/>
-              <a:t>Can be color, transparent</a:t>
+              <a:t>Sets the border properties: width, style, color</a:t>
             </a:r>
           </a:p>
           <a:p>
             <a:r>
               <a:rPr lang="en-US" dirty="0"/>
-              <a:t>Use </a:t>
-            </a:r>
-            <a:r>
-              <a:rPr lang="en-US" dirty="0" smtClean="0"/>
-              <a:t>"clock" shorthand </a:t>
+              <a:t>Use "clock" shorthand or use border-</a:t>
+            </a:r>
+            <a:r>
+              <a:rPr lang="en-US" dirty="0" smtClean="0"/>
+              <a:t>top, </a:t>
             </a:r>
             <a:r>
               <a:rPr lang="en-US" dirty="0"/>
-              <a:t>or use </a:t>
-            </a:r>
-            <a:r>
-              <a:rPr lang="en-US" dirty="0" smtClean="0"/>
-              <a:t>border-top-color, </a:t>
+              <a:t>border-</a:t>
+            </a:r>
+            <a:r>
+              <a:rPr lang="en-US" dirty="0" smtClean="0"/>
+              <a:t>right, </a:t>
             </a:r>
             <a:r>
               <a:rPr lang="en-US" dirty="0"/>
-              <a:t>border</a:t>
-            </a:r>
-            <a:r>
-              <a:rPr lang="en-US" dirty="0" smtClean="0"/>
-              <a:t>-right-color, </a:t>
+              <a:t>border-</a:t>
+            </a:r>
+            <a:r>
+              <a:rPr lang="en-US" dirty="0" smtClean="0"/>
+              <a:t>bottom, </a:t>
             </a:r>
             <a:r>
               <a:rPr lang="en-US" dirty="0"/>
-              <a:t>border</a:t>
-            </a:r>
-            <a:r>
-              <a:rPr lang="en-US" dirty="0" smtClean="0"/>
-              <a:t>-bottom-color, </a:t>
-            </a:r>
-            <a:r>
-              <a:rPr lang="en-US" dirty="0"/>
-              <a:t>border</a:t>
-            </a:r>
-            <a:r>
-              <a:rPr lang="en-US" dirty="0" smtClean="0"/>
-              <a:t>-left-color</a:t>
-            </a:r>
-            <a:endParaRPr lang="en-US" dirty="0"/>
-          </a:p>
-          <a:p>
-            <a:r>
-              <a:rPr lang="en-US" sz="2000" dirty="0">
-                <a:latin typeface="Courier New"/>
-                <a:cs typeface="Courier New"/>
-              </a:rPr>
-              <a:t>b</a:t>
-            </a:r>
+              <a:t>border-</a:t>
+            </a:r>
+            <a:r>
+              <a:rPr lang="en-US" dirty="0" smtClean="0"/>
+              <a:t>left</a:t>
+            </a:r>
+          </a:p>
+          <a:p>
             <a:r>
               <a:rPr lang="en-US" sz="2000" dirty="0" smtClean="0">
                 <a:latin typeface="Courier New"/>
                 <a:cs typeface="Courier New"/>
               </a:rPr>
-              <a:t>order-color: red;</a:t>
-            </a:r>
+              <a:t>border: 1px solid #000;</a:t>
+            </a:r>
+            <a:endParaRPr lang="en-US" sz="2000" dirty="0">
+              <a:latin typeface="Courier New"/>
+              <a:cs typeface="Courier New"/>
+            </a:endParaRPr>
           </a:p>
         </p:txBody>
       </p:sp>
@@ -8963,10 +8959,6 @@
             <a:r>
               <a:rPr lang="en-US" dirty="0" err="1" smtClean="0"/>
               <a:t>index.html</a:t>
-            </a:r>
-            <a:r>
-              <a:rPr lang="en-US" dirty="0" smtClean="0"/>
-              <a:t> </a:t>
             </a:r>
             <a:endParaRPr lang="en-US" dirty="0"/>
           </a:p>
@@ -8975,7 +8967,7 @@
     </p:spTree>
     <p:extLst>
       <p:ext uri="{BB962C8B-B14F-4D97-AF65-F5344CB8AC3E}">
-        <p14:creationId xmlns:p14="http://schemas.microsoft.com/office/powerpoint/2010/main" val="3456313812"/>
+        <p14:creationId xmlns:p14="http://schemas.microsoft.com/office/powerpoint/2010/main" val="3192035239"/>
       </p:ext>
     </p:extLst>
   </p:cSld>
@@ -9019,7 +9011,7 @@
           <a:p>
             <a:r>
               <a:rPr lang="en-US" dirty="0" smtClean="0"/>
-              <a:t>border-style</a:t>
+              <a:t>border-width</a:t>
             </a:r>
             <a:endParaRPr lang="en-US" dirty="0"/>
           </a:p>
@@ -9038,7 +9030,7 @@
         <p:spPr/>
         <p:txBody>
           <a:bodyPr>
-            <a:normAutofit fontScale="92500" lnSpcReduction="10000"/>
+            <a:normAutofit/>
           </a:bodyPr>
           <a:lstStyle/>
           <a:p>
@@ -9050,20 +9042,20 @@
               <a:rPr lang="en-US" dirty="0" smtClean="0">
                 <a:hlinkClick r:id="rId2"/>
               </a:rPr>
-              <a:t>http://www.w3.org/TR/CSS21/box.html - propdef-border-top-style</a:t>
+              <a:t>http://www.w3.org/TR/CSS21/box.html - propdef-border-top-width</a:t>
             </a:r>
             <a:endParaRPr lang="en-US" dirty="0" smtClean="0"/>
           </a:p>
           <a:p>
             <a:r>
               <a:rPr lang="en-US" dirty="0" smtClean="0"/>
-              <a:t>Sets the border style</a:t>
-            </a:r>
-          </a:p>
-          <a:p>
-            <a:r>
-              <a:rPr lang="en-US" dirty="0" smtClean="0"/>
-              <a:t>Can be none, hidden, dotted, dashed, solid, double, groove, ridge, inset, outset</a:t>
+              <a:t>Sets the border width</a:t>
+            </a:r>
+          </a:p>
+          <a:p>
+            <a:r>
+              <a:rPr lang="en-US" dirty="0" smtClean="0"/>
+              <a:t>Can be thin, medium, thick, length</a:t>
             </a:r>
           </a:p>
           <a:p>
@@ -9081,7 +9073,7 @@
             </a:r>
             <a:r>
               <a:rPr lang="en-US" dirty="0" smtClean="0"/>
-              <a:t>border-top-color, </a:t>
+              <a:t>border-top-width, </a:t>
             </a:r>
             <a:r>
               <a:rPr lang="en-US" dirty="0"/>
@@ -9089,7 +9081,15 @@
             </a:r>
             <a:r>
               <a:rPr lang="en-US" dirty="0" smtClean="0"/>
-              <a:t>-right-color, </a:t>
+              <a:t>-right-</a:t>
+            </a:r>
+            <a:r>
+              <a:rPr lang="en-US" dirty="0"/>
+              <a:t>width</a:t>
+            </a:r>
+            <a:r>
+              <a:rPr lang="en-US" dirty="0" smtClean="0"/>
+              <a:t>, </a:t>
             </a:r>
             <a:r>
               <a:rPr lang="en-US" dirty="0"/>
@@ -9097,7 +9097,15 @@
             </a:r>
             <a:r>
               <a:rPr lang="en-US" dirty="0" smtClean="0"/>
-              <a:t>-bottom-color, </a:t>
+              <a:t>-bottom-</a:t>
+            </a:r>
+            <a:r>
+              <a:rPr lang="en-US" dirty="0"/>
+              <a:t>width</a:t>
+            </a:r>
+            <a:r>
+              <a:rPr lang="en-US" dirty="0" smtClean="0"/>
+              <a:t>, </a:t>
             </a:r>
             <a:r>
               <a:rPr lang="en-US" dirty="0"/>
@@ -9105,9 +9113,12 @@
             </a:r>
             <a:r>
               <a:rPr lang="en-US" dirty="0" smtClean="0"/>
-              <a:t>-left-color</a:t>
-            </a:r>
-            <a:endParaRPr lang="en-US" dirty="0"/>
+              <a:t>-left-</a:t>
+            </a:r>
+            <a:r>
+              <a:rPr lang="en-US" dirty="0"/>
+              <a:t>width</a:t>
+            </a:r>
           </a:p>
           <a:p>
             <a:r>
@@ -9122,7 +9133,7 @@
                 <a:latin typeface="Courier New"/>
                 <a:cs typeface="Courier New"/>
               </a:rPr>
-              <a:t>order-style: solid;</a:t>
+              <a:t>order-width: medium;</a:t>
             </a:r>
           </a:p>
         </p:txBody>
@@ -9177,7 +9188,7 @@
     </p:spTree>
     <p:extLst>
       <p:ext uri="{BB962C8B-B14F-4D97-AF65-F5344CB8AC3E}">
-        <p14:creationId xmlns:p14="http://schemas.microsoft.com/office/powerpoint/2010/main" val="1392145779"/>
+        <p14:creationId xmlns:p14="http://schemas.microsoft.com/office/powerpoint/2010/main" val="3601305251"/>
       </p:ext>
     </p:extLst>
   </p:cSld>
@@ -9221,7 +9232,7 @@
           <a:p>
             <a:r>
               <a:rPr lang="en-US" dirty="0" smtClean="0"/>
-              <a:t>margin</a:t>
+              <a:t>border-color</a:t>
             </a:r>
             <a:endParaRPr lang="en-US" dirty="0"/>
           </a:p>
@@ -9252,40 +9263,80 @@
               <a:rPr lang="en-US" dirty="0" smtClean="0">
                 <a:hlinkClick r:id="rId2"/>
               </a:rPr>
-              <a:t>http://www.w3.org/TR/CSS21/box.html - propdef-margin</a:t>
+              <a:t>http://www.w3.org/TR/CSS21/box.html - propdef-border-top-color</a:t>
             </a:r>
             <a:endParaRPr lang="en-US" dirty="0" smtClean="0"/>
           </a:p>
           <a:p>
             <a:r>
               <a:rPr lang="en-US" dirty="0" smtClean="0"/>
-              <a:t>Pads the outside of an element</a:t>
-            </a:r>
-          </a:p>
-          <a:p>
-            <a:r>
-              <a:rPr lang="en-US" dirty="0" smtClean="0"/>
-              <a:t>Can be a length, %, auto</a:t>
-            </a:r>
-          </a:p>
-          <a:p>
-            <a:r>
-              <a:rPr lang="en-US" dirty="0" smtClean="0"/>
-              <a:t>Use "clock" shorthand or use margin-top, margin-right, margin-bottom, margin-left</a:t>
-            </a:r>
-          </a:p>
-          <a:p>
+              <a:t>Sets the border color</a:t>
+            </a:r>
+          </a:p>
+          <a:p>
+            <a:r>
+              <a:rPr lang="en-US" dirty="0" smtClean="0"/>
+              <a:t>Can be color, transparent</a:t>
+            </a:r>
+          </a:p>
+          <a:p>
+            <a:r>
+              <a:rPr lang="en-US" dirty="0"/>
+              <a:t>Use </a:t>
+            </a:r>
+            <a:r>
+              <a:rPr lang="en-US" dirty="0" smtClean="0"/>
+              <a:t>"clock" shorthand </a:t>
+            </a:r>
+            <a:r>
+              <a:rPr lang="en-US" dirty="0"/>
+              <a:t>or use </a:t>
+            </a:r>
+            <a:r>
+              <a:rPr lang="en-US" dirty="0" smtClean="0"/>
+              <a:t>border-top-color, </a:t>
+            </a:r>
+            <a:r>
+              <a:rPr lang="en-US" dirty="0"/>
+              <a:t>border</a:t>
+            </a:r>
+            <a:r>
+              <a:rPr lang="en-US" dirty="0" smtClean="0"/>
+              <a:t>-right-color, </a:t>
+            </a:r>
+            <a:r>
+              <a:rPr lang="en-US" dirty="0"/>
+              <a:t>border</a:t>
+            </a:r>
+            <a:r>
+              <a:rPr lang="en-US" dirty="0" smtClean="0"/>
+              <a:t>-bottom-color, </a:t>
+            </a:r>
+            <a:r>
+              <a:rPr lang="en-US" dirty="0"/>
+              <a:t>border</a:t>
+            </a:r>
+            <a:r>
+              <a:rPr lang="en-US" dirty="0" smtClean="0"/>
+              <a:t>-left-color</a:t>
+            </a:r>
+            <a:endParaRPr lang="en-US" dirty="0"/>
+          </a:p>
+          <a:p>
+            <a:r>
+              <a:rPr lang="en-US" sz="2000" dirty="0">
+                <a:latin typeface="Courier New"/>
+                <a:cs typeface="Courier New"/>
+              </a:rPr>
+              <a:t>b</a:t>
+            </a:r>
             <a:r>
               <a:rPr lang="en-US" sz="2000" dirty="0" smtClean="0">
                 <a:latin typeface="Courier New"/>
                 <a:cs typeface="Courier New"/>
               </a:rPr>
-              <a:t>margin: 8px;</a:t>
-            </a:r>
-            <a:endParaRPr lang="en-US" sz="2000" dirty="0">
-              <a:latin typeface="Courier New"/>
-              <a:cs typeface="Courier New"/>
-            </a:endParaRPr>
+              <a:t>order-color: red;</a:t>
+            </a:r>
           </a:p>
         </p:txBody>
       </p:sp>
@@ -9318,15 +9369,19 @@
             </a:r>
             <a:r>
               <a:rPr lang="en-US" dirty="0" err="1" smtClean="0"/>
-              <a:t>classfive</a:t>
-            </a:r>
-            <a:r>
-              <a:rPr lang="en-US" dirty="0" smtClean="0"/>
-              <a:t>/slides/margin/</a:t>
+              <a:t>classfour</a:t>
+            </a:r>
+            <a:r>
+              <a:rPr lang="en-US" dirty="0" smtClean="0"/>
+              <a:t>/slides/border/</a:t>
             </a:r>
             <a:r>
               <a:rPr lang="en-US" dirty="0" err="1" smtClean="0"/>
               <a:t>index.html</a:t>
+            </a:r>
+            <a:r>
+              <a:rPr lang="en-US" dirty="0" smtClean="0"/>
+              <a:t> </a:t>
             </a:r>
             <a:endParaRPr lang="en-US" dirty="0"/>
           </a:p>
@@ -9335,7 +9390,7 @@
     </p:spTree>
     <p:extLst>
       <p:ext uri="{BB962C8B-B14F-4D97-AF65-F5344CB8AC3E}">
-        <p14:creationId xmlns:p14="http://schemas.microsoft.com/office/powerpoint/2010/main" val="2343118388"/>
+        <p14:creationId xmlns:p14="http://schemas.microsoft.com/office/powerpoint/2010/main" val="3456313812"/>
       </p:ext>
     </p:extLst>
   </p:cSld>
@@ -9364,6 +9419,366 @@
       </p:grpSpPr>
       <p:sp>
         <p:nvSpPr>
+          <p:cNvPr id="2" name="Title 1"/>
+          <p:cNvSpPr>
+            <a:spLocks noGrp="1"/>
+          </p:cNvSpPr>
+          <p:nvPr>
+            <p:ph type="title"/>
+          </p:nvPr>
+        </p:nvSpPr>
+        <p:spPr/>
+        <p:txBody>
+          <a:bodyPr/>
+          <a:lstStyle/>
+          <a:p>
+            <a:r>
+              <a:rPr lang="en-US" dirty="0" smtClean="0"/>
+              <a:t>border-style</a:t>
+            </a:r>
+            <a:endParaRPr lang="en-US" dirty="0"/>
+          </a:p>
+        </p:txBody>
+      </p:sp>
+      <p:sp>
+        <p:nvSpPr>
+          <p:cNvPr id="3" name="Content Placeholder 2"/>
+          <p:cNvSpPr>
+            <a:spLocks noGrp="1"/>
+          </p:cNvSpPr>
+          <p:nvPr>
+            <p:ph idx="1"/>
+          </p:nvPr>
+        </p:nvSpPr>
+        <p:spPr/>
+        <p:txBody>
+          <a:bodyPr>
+            <a:normAutofit fontScale="92500" lnSpcReduction="10000"/>
+          </a:bodyPr>
+          <a:lstStyle/>
+          <a:p>
+            <a:r>
+              <a:rPr lang="en-US" dirty="0" smtClean="0"/>
+              <a:t>Learn more: </a:t>
+            </a:r>
+            <a:r>
+              <a:rPr lang="en-US" dirty="0" smtClean="0">
+                <a:hlinkClick r:id="rId2"/>
+              </a:rPr>
+              <a:t>http://www.w3.org/TR/CSS21/box.html - propdef-border-top-style</a:t>
+            </a:r>
+            <a:endParaRPr lang="en-US" dirty="0" smtClean="0"/>
+          </a:p>
+          <a:p>
+            <a:r>
+              <a:rPr lang="en-US" dirty="0" smtClean="0"/>
+              <a:t>Sets the border style</a:t>
+            </a:r>
+          </a:p>
+          <a:p>
+            <a:r>
+              <a:rPr lang="en-US" dirty="0" smtClean="0"/>
+              <a:t>Can be none, hidden, dotted, dashed, solid, double, groove, ridge, inset, outset</a:t>
+            </a:r>
+          </a:p>
+          <a:p>
+            <a:r>
+              <a:rPr lang="en-US" dirty="0"/>
+              <a:t>Use </a:t>
+            </a:r>
+            <a:r>
+              <a:rPr lang="en-US" dirty="0" smtClean="0"/>
+              <a:t>"clock" shorthand </a:t>
+            </a:r>
+            <a:r>
+              <a:rPr lang="en-US" dirty="0"/>
+              <a:t>or use </a:t>
+            </a:r>
+            <a:r>
+              <a:rPr lang="en-US" dirty="0" smtClean="0"/>
+              <a:t>border-top-color, </a:t>
+            </a:r>
+            <a:r>
+              <a:rPr lang="en-US" dirty="0"/>
+              <a:t>border</a:t>
+            </a:r>
+            <a:r>
+              <a:rPr lang="en-US" dirty="0" smtClean="0"/>
+              <a:t>-right-color, </a:t>
+            </a:r>
+            <a:r>
+              <a:rPr lang="en-US" dirty="0"/>
+              <a:t>border</a:t>
+            </a:r>
+            <a:r>
+              <a:rPr lang="en-US" dirty="0" smtClean="0"/>
+              <a:t>-bottom-color, </a:t>
+            </a:r>
+            <a:r>
+              <a:rPr lang="en-US" dirty="0"/>
+              <a:t>border</a:t>
+            </a:r>
+            <a:r>
+              <a:rPr lang="en-US" dirty="0" smtClean="0"/>
+              <a:t>-left-color</a:t>
+            </a:r>
+            <a:endParaRPr lang="en-US" dirty="0"/>
+          </a:p>
+          <a:p>
+            <a:r>
+              <a:rPr lang="en-US" sz="2000" dirty="0">
+                <a:latin typeface="Courier New"/>
+                <a:cs typeface="Courier New"/>
+              </a:rPr>
+              <a:t>b</a:t>
+            </a:r>
+            <a:r>
+              <a:rPr lang="en-US" sz="2000" dirty="0" smtClean="0">
+                <a:latin typeface="Courier New"/>
+                <a:cs typeface="Courier New"/>
+              </a:rPr>
+              <a:t>order-style: solid;</a:t>
+            </a:r>
+          </a:p>
+        </p:txBody>
+      </p:sp>
+      <p:sp>
+        <p:nvSpPr>
+          <p:cNvPr id="4" name="Footer Placeholder 3"/>
+          <p:cNvSpPr>
+            <a:spLocks noGrp="1"/>
+          </p:cNvSpPr>
+          <p:nvPr>
+            <p:ph type="ftr" sz="quarter" idx="11"/>
+          </p:nvPr>
+        </p:nvSpPr>
+        <p:spPr/>
+        <p:txBody>
+          <a:bodyPr/>
+          <a:lstStyle/>
+          <a:p>
+            <a:r>
+              <a:rPr lang="en-US" dirty="0" smtClean="0"/>
+              <a:t>http://</a:t>
+            </a:r>
+            <a:r>
+              <a:rPr lang="en-US" dirty="0" err="1" smtClean="0"/>
+              <a:t>dl.dropbox.com</a:t>
+            </a:r>
+            <a:r>
+              <a:rPr lang="en-US" dirty="0" smtClean="0"/>
+              <a:t>/u/41609448/art329/slides/</a:t>
+            </a:r>
+            <a:r>
+              <a:rPr lang="en-US" dirty="0" err="1" smtClean="0"/>
+              <a:t>classfour</a:t>
+            </a:r>
+            <a:r>
+              <a:rPr lang="en-US" dirty="0" smtClean="0"/>
+              <a:t>/slides/border/</a:t>
+            </a:r>
+            <a:r>
+              <a:rPr lang="en-US" dirty="0" err="1" smtClean="0"/>
+              <a:t>index.html</a:t>
+            </a:r>
+            <a:r>
+              <a:rPr lang="en-US" dirty="0" smtClean="0"/>
+              <a:t> </a:t>
+            </a:r>
+            <a:endParaRPr lang="en-US" dirty="0"/>
+          </a:p>
+        </p:txBody>
+      </p:sp>
+    </p:spTree>
+    <p:extLst>
+      <p:ext uri="{BB962C8B-B14F-4D97-AF65-F5344CB8AC3E}">
+        <p14:creationId xmlns:p14="http://schemas.microsoft.com/office/powerpoint/2010/main" val="1392145779"/>
+      </p:ext>
+    </p:extLst>
+  </p:cSld>
+  <p:clrMapOvr>
+    <a:masterClrMapping/>
+  </p:clrMapOvr>
+</p:sld>
+</file>
+
+<file path=ppt/slides/slide28.xml><?xml version="1.0" encoding="utf-8"?>
+<p:sld xmlns:a="http://schemas.openxmlformats.org/drawingml/2006/main" xmlns:r="http://schemas.openxmlformats.org/officeDocument/2006/relationships" xmlns:p="http://schemas.openxmlformats.org/presentationml/2006/main">
+  <p:cSld>
+    <p:spTree>
+      <p:nvGrpSpPr>
+        <p:cNvPr id="1" name=""/>
+        <p:cNvGrpSpPr/>
+        <p:nvPr/>
+      </p:nvGrpSpPr>
+      <p:grpSpPr>
+        <a:xfrm>
+          <a:off x="0" y="0"/>
+          <a:ext cx="0" cy="0"/>
+          <a:chOff x="0" y="0"/>
+          <a:chExt cx="0" cy="0"/>
+        </a:xfrm>
+      </p:grpSpPr>
+      <p:sp>
+        <p:nvSpPr>
+          <p:cNvPr id="2" name="Title 1"/>
+          <p:cNvSpPr>
+            <a:spLocks noGrp="1"/>
+          </p:cNvSpPr>
+          <p:nvPr>
+            <p:ph type="title"/>
+          </p:nvPr>
+        </p:nvSpPr>
+        <p:spPr/>
+        <p:txBody>
+          <a:bodyPr/>
+          <a:lstStyle/>
+          <a:p>
+            <a:r>
+              <a:rPr lang="en-US" dirty="0" smtClean="0"/>
+              <a:t>margin</a:t>
+            </a:r>
+            <a:endParaRPr lang="en-US" dirty="0"/>
+          </a:p>
+        </p:txBody>
+      </p:sp>
+      <p:sp>
+        <p:nvSpPr>
+          <p:cNvPr id="3" name="Content Placeholder 2"/>
+          <p:cNvSpPr>
+            <a:spLocks noGrp="1"/>
+          </p:cNvSpPr>
+          <p:nvPr>
+            <p:ph idx="1"/>
+          </p:nvPr>
+        </p:nvSpPr>
+        <p:spPr/>
+        <p:txBody>
+          <a:bodyPr>
+            <a:normAutofit/>
+          </a:bodyPr>
+          <a:lstStyle/>
+          <a:p>
+            <a:r>
+              <a:rPr lang="en-US" dirty="0" smtClean="0"/>
+              <a:t>Learn more: </a:t>
+            </a:r>
+            <a:r>
+              <a:rPr lang="en-US" dirty="0" smtClean="0">
+                <a:hlinkClick r:id="rId2"/>
+              </a:rPr>
+              <a:t>http://www.w3.org/TR/CSS21/box.html - propdef-margin</a:t>
+            </a:r>
+            <a:endParaRPr lang="en-US" dirty="0" smtClean="0"/>
+          </a:p>
+          <a:p>
+            <a:r>
+              <a:rPr lang="en-US" dirty="0" smtClean="0"/>
+              <a:t>Pads the outside of an element</a:t>
+            </a:r>
+          </a:p>
+          <a:p>
+            <a:r>
+              <a:rPr lang="en-US" dirty="0" smtClean="0"/>
+              <a:t>Can be a length, %, auto</a:t>
+            </a:r>
+          </a:p>
+          <a:p>
+            <a:r>
+              <a:rPr lang="en-US" dirty="0" smtClean="0"/>
+              <a:t>Use "clock" shorthand or use margin-top, margin-right, margin-bottom, margin-left</a:t>
+            </a:r>
+          </a:p>
+          <a:p>
+            <a:r>
+              <a:rPr lang="en-US" sz="2000" dirty="0" smtClean="0">
+                <a:latin typeface="Courier New"/>
+                <a:cs typeface="Courier New"/>
+              </a:rPr>
+              <a:t>margin: 8px;</a:t>
+            </a:r>
+            <a:endParaRPr lang="en-US" sz="2000" dirty="0">
+              <a:latin typeface="Courier New"/>
+              <a:cs typeface="Courier New"/>
+            </a:endParaRPr>
+          </a:p>
+        </p:txBody>
+      </p:sp>
+      <p:sp>
+        <p:nvSpPr>
+          <p:cNvPr id="4" name="Footer Placeholder 3"/>
+          <p:cNvSpPr>
+            <a:spLocks noGrp="1"/>
+          </p:cNvSpPr>
+          <p:nvPr>
+            <p:ph type="ftr" sz="quarter" idx="11"/>
+          </p:nvPr>
+        </p:nvSpPr>
+        <p:spPr/>
+        <p:txBody>
+          <a:bodyPr/>
+          <a:lstStyle/>
+          <a:p>
+            <a:r>
+              <a:rPr lang="en-US" dirty="0" smtClean="0"/>
+              <a:t>http://</a:t>
+            </a:r>
+            <a:r>
+              <a:rPr lang="en-US" dirty="0" err="1" smtClean="0"/>
+              <a:t>dl.dropbox.com</a:t>
+            </a:r>
+            <a:r>
+              <a:rPr lang="en-US" dirty="0" smtClean="0"/>
+              <a:t>/u/41609448/art329/slides/</a:t>
+            </a:r>
+            <a:r>
+              <a:rPr lang="en-US" dirty="0" err="1" smtClean="0"/>
+              <a:t>classfive</a:t>
+            </a:r>
+            <a:r>
+              <a:rPr lang="en-US" dirty="0" smtClean="0"/>
+              <a:t>/slides/margin/</a:t>
+            </a:r>
+            <a:r>
+              <a:rPr lang="en-US" dirty="0" err="1" smtClean="0"/>
+              <a:t>index.html</a:t>
+            </a:r>
+            <a:endParaRPr lang="en-US" dirty="0"/>
+          </a:p>
+        </p:txBody>
+      </p:sp>
+    </p:spTree>
+    <p:extLst>
+      <p:ext uri="{BB962C8B-B14F-4D97-AF65-F5344CB8AC3E}">
+        <p14:creationId xmlns:p14="http://schemas.microsoft.com/office/powerpoint/2010/main" val="2343118388"/>
+      </p:ext>
+    </p:extLst>
+  </p:cSld>
+  <p:clrMapOvr>
+    <a:masterClrMapping/>
+  </p:clrMapOvr>
+</p:sld>
+</file>
+
+<file path=ppt/slides/slide29.xml><?xml version="1.0" encoding="utf-8"?>
+<p:sld xmlns:a="http://schemas.openxmlformats.org/drawingml/2006/main" xmlns:r="http://schemas.openxmlformats.org/officeDocument/2006/relationships" xmlns:p="http://schemas.openxmlformats.org/presentationml/2006/main">
+  <p:cSld>
+    <p:spTree>
+      <p:nvGrpSpPr>
+        <p:cNvPr id="1" name=""/>
+        <p:cNvGrpSpPr/>
+        <p:nvPr/>
+      </p:nvGrpSpPr>
+      <p:grpSpPr>
+        <a:xfrm>
+          <a:off x="0" y="0"/>
+          <a:ext cx="0" cy="0"/>
+          <a:chOff x="0" y="0"/>
+          <a:chExt cx="0" cy="0"/>
+        </a:xfrm>
+      </p:grpSpPr>
+      <p:sp>
+        <p:nvSpPr>
           <p:cNvPr id="3" name="Title 2"/>
           <p:cNvSpPr>
             <a:spLocks noGrp="1"/>
@@ -9424,7 +9839,108 @@
 </p:sld>
 </file>
 
-<file path=ppt/slides/slide28.xml><?xml version="1.0" encoding="utf-8"?>
+<file path=ppt/slides/slide3.xml><?xml version="1.0" encoding="utf-8"?>
+<p:sld xmlns:a="http://schemas.openxmlformats.org/drawingml/2006/main" xmlns:r="http://schemas.openxmlformats.org/officeDocument/2006/relationships" xmlns:p="http://schemas.openxmlformats.org/presentationml/2006/main">
+  <p:cSld>
+    <p:spTree>
+      <p:nvGrpSpPr>
+        <p:cNvPr id="1" name=""/>
+        <p:cNvGrpSpPr/>
+        <p:nvPr/>
+      </p:nvGrpSpPr>
+      <p:grpSpPr>
+        <a:xfrm>
+          <a:off x="0" y="0"/>
+          <a:ext cx="0" cy="0"/>
+          <a:chOff x="0" y="0"/>
+          <a:chExt cx="0" cy="0"/>
+        </a:xfrm>
+      </p:grpSpPr>
+      <p:sp>
+        <p:nvSpPr>
+          <p:cNvPr id="2" name="Title 1"/>
+          <p:cNvSpPr>
+            <a:spLocks noGrp="1"/>
+          </p:cNvSpPr>
+          <p:nvPr>
+            <p:ph type="title"/>
+          </p:nvPr>
+        </p:nvSpPr>
+        <p:spPr/>
+        <p:txBody>
+          <a:bodyPr/>
+          <a:lstStyle/>
+          <a:p>
+            <a:r>
+              <a:rPr lang="en-US" dirty="0" smtClean="0"/>
+              <a:t>Review - Theme</a:t>
+            </a:r>
+            <a:endParaRPr lang="en-US" dirty="0"/>
+          </a:p>
+        </p:txBody>
+      </p:sp>
+      <p:sp>
+        <p:nvSpPr>
+          <p:cNvPr id="3" name="Content Placeholder 2"/>
+          <p:cNvSpPr>
+            <a:spLocks noGrp="1"/>
+          </p:cNvSpPr>
+          <p:nvPr>
+            <p:ph idx="1"/>
+          </p:nvPr>
+        </p:nvSpPr>
+        <p:spPr/>
+        <p:txBody>
+          <a:bodyPr/>
+          <a:lstStyle/>
+          <a:p>
+            <a:r>
+              <a:rPr lang="en-US" dirty="0" smtClean="0"/>
+              <a:t>Represents your site's purpose and content</a:t>
+            </a:r>
+          </a:p>
+          <a:p>
+            <a:r>
+              <a:rPr lang="en-US" dirty="0" err="1" smtClean="0"/>
+              <a:t>Amazon.com</a:t>
+            </a:r>
+            <a:r>
+              <a:rPr lang="en-US" dirty="0" smtClean="0"/>
+              <a:t>: an online merchant that focuses on books</a:t>
+            </a:r>
+          </a:p>
+          <a:p>
+            <a:r>
+              <a:rPr lang="en-US" dirty="0" smtClean="0"/>
+              <a:t>Visual metaphor reinforces the theme</a:t>
+            </a:r>
+          </a:p>
+          <a:p>
+            <a:endParaRPr lang="en-US" dirty="0"/>
+          </a:p>
+        </p:txBody>
+      </p:sp>
+    </p:spTree>
+    <p:extLst>
+      <p:ext uri="{BB962C8B-B14F-4D97-AF65-F5344CB8AC3E}">
+        <p14:creationId xmlns:p14="http://schemas.microsoft.com/office/powerpoint/2010/main" val="1571346728"/>
+      </p:ext>
+    </p:extLst>
+  </p:cSld>
+  <p:clrMapOvr>
+    <a:masterClrMapping/>
+  </p:clrMapOvr>
+  <p:timing>
+    <p:tnLst>
+      <p:par>
+        <p:cTn xmlns:p14="http://schemas.microsoft.com/office/powerpoint/2010/main" id="1" dur="indefinite" restart="never" nodeType="tmRoot"/>
+      </p:par>
+    </p:tnLst>
+  </p:timing>
+</p:sld>
+</file>
+
+<file path=ppt/slides/slide30.xml><?xml version="1.0" encoding="utf-8"?>
 <p:sld xmlns:a="http://schemas.openxmlformats.org/drawingml/2006/main" xmlns:r="http://schemas.openxmlformats.org/officeDocument/2006/relationships" xmlns:p="http://schemas.openxmlformats.org/presentationml/2006/main">
   <p:cSld>
     <p:spTree>
@@ -9511,275 +10027,6 @@
 </p:sld>
 </file>
 
-<file path=ppt/slides/slide29.xml><?xml version="1.0" encoding="utf-8"?>
-<p:sld xmlns:a="http://schemas.openxmlformats.org/drawingml/2006/main" xmlns:r="http://schemas.openxmlformats.org/officeDocument/2006/relationships" xmlns:p="http://schemas.openxmlformats.org/presentationml/2006/main">
-  <p:cSld>
-    <p:spTree>
-      <p:nvGrpSpPr>
-        <p:cNvPr id="1" name=""/>
-        <p:cNvGrpSpPr/>
-        <p:nvPr/>
-      </p:nvGrpSpPr>
-      <p:grpSpPr>
-        <a:xfrm>
-          <a:off x="0" y="0"/>
-          <a:ext cx="0" cy="0"/>
-          <a:chOff x="0" y="0"/>
-          <a:chExt cx="0" cy="0"/>
-        </a:xfrm>
-      </p:grpSpPr>
-      <p:sp>
-        <p:nvSpPr>
-          <p:cNvPr id="2" name="Title 1"/>
-          <p:cNvSpPr>
-            <a:spLocks noGrp="1"/>
-          </p:cNvSpPr>
-          <p:nvPr>
-            <p:ph type="title"/>
-          </p:nvPr>
-        </p:nvSpPr>
-        <p:spPr/>
-        <p:txBody>
-          <a:bodyPr/>
-          <a:lstStyle/>
-          <a:p>
-            <a:r>
-              <a:rPr lang="en-US" dirty="0" smtClean="0"/>
-              <a:t>Navigation</a:t>
-            </a:r>
-            <a:endParaRPr lang="en-US" dirty="0"/>
-          </a:p>
-        </p:txBody>
-      </p:sp>
-      <p:sp>
-        <p:nvSpPr>
-          <p:cNvPr id="3" name="Content Placeholder 2"/>
-          <p:cNvSpPr>
-            <a:spLocks noGrp="1"/>
-          </p:cNvSpPr>
-          <p:nvPr>
-            <p:ph idx="1"/>
-          </p:nvPr>
-        </p:nvSpPr>
-        <p:spPr/>
-        <p:txBody>
-          <a:bodyPr/>
-          <a:lstStyle/>
-          <a:p>
-            <a:r>
-              <a:rPr lang="en-US" dirty="0" smtClean="0"/>
-              <a:t>Users are impatient</a:t>
-            </a:r>
-          </a:p>
-          <a:p>
-            <a:r>
-              <a:rPr lang="en-US" dirty="0" smtClean="0"/>
-              <a:t>Google increased page load from .4 to .9 and lost 20% traffic</a:t>
-            </a:r>
-          </a:p>
-          <a:p>
-            <a:r>
-              <a:rPr lang="en-US" dirty="0" smtClean="0"/>
-              <a:t>If they can't find their way around your website, they will leave</a:t>
-            </a:r>
-          </a:p>
-          <a:p>
-            <a:r>
-              <a:rPr lang="en-US" dirty="0" smtClean="0"/>
-              <a:t>Navigation is key to answering this impatience</a:t>
-            </a:r>
-          </a:p>
-        </p:txBody>
-      </p:sp>
-    </p:spTree>
-    <p:extLst>
-      <p:ext uri="{BB962C8B-B14F-4D97-AF65-F5344CB8AC3E}">
-        <p14:creationId xmlns:p14="http://schemas.microsoft.com/office/powerpoint/2010/main" val="584142683"/>
-      </p:ext>
-    </p:extLst>
-  </p:cSld>
-  <p:clrMapOvr>
-    <a:masterClrMapping/>
-  </p:clrMapOvr>
-</p:sld>
-</file>
-
-<file path=ppt/slides/slide3.xml><?xml version="1.0" encoding="utf-8"?>
-<p:sld xmlns:a="http://schemas.openxmlformats.org/drawingml/2006/main" xmlns:r="http://schemas.openxmlformats.org/officeDocument/2006/relationships" xmlns:p="http://schemas.openxmlformats.org/presentationml/2006/main">
-  <p:cSld>
-    <p:spTree>
-      <p:nvGrpSpPr>
-        <p:cNvPr id="1" name=""/>
-        <p:cNvGrpSpPr/>
-        <p:nvPr/>
-      </p:nvGrpSpPr>
-      <p:grpSpPr>
-        <a:xfrm>
-          <a:off x="0" y="0"/>
-          <a:ext cx="0" cy="0"/>
-          <a:chOff x="0" y="0"/>
-          <a:chExt cx="0" cy="0"/>
-        </a:xfrm>
-      </p:grpSpPr>
-      <p:sp>
-        <p:nvSpPr>
-          <p:cNvPr id="2" name="Title 1"/>
-          <p:cNvSpPr>
-            <a:spLocks noGrp="1"/>
-          </p:cNvSpPr>
-          <p:nvPr>
-            <p:ph type="title"/>
-          </p:nvPr>
-        </p:nvSpPr>
-        <p:spPr/>
-        <p:txBody>
-          <a:bodyPr/>
-          <a:lstStyle/>
-          <a:p>
-            <a:r>
-              <a:rPr lang="en-US" dirty="0" smtClean="0"/>
-              <a:t>What’s New?</a:t>
-            </a:r>
-            <a:endParaRPr lang="en-US" dirty="0"/>
-          </a:p>
-        </p:txBody>
-      </p:sp>
-      <p:sp>
-        <p:nvSpPr>
-          <p:cNvPr id="3" name="Content Placeholder 2"/>
-          <p:cNvSpPr>
-            <a:spLocks noGrp="1"/>
-          </p:cNvSpPr>
-          <p:nvPr>
-            <p:ph idx="1"/>
-          </p:nvPr>
-        </p:nvSpPr>
-        <p:spPr/>
-        <p:txBody>
-          <a:bodyPr/>
-          <a:lstStyle/>
-          <a:p>
-            <a:r>
-              <a:rPr lang="en-US" dirty="0" smtClean="0"/>
-              <a:t>Nothing</a:t>
-            </a:r>
-            <a:endParaRPr lang="en-US" dirty="0"/>
-          </a:p>
-        </p:txBody>
-      </p:sp>
-    </p:spTree>
-    <p:extLst>
-      <p:ext uri="{BB962C8B-B14F-4D97-AF65-F5344CB8AC3E}">
-        <p14:creationId xmlns:p14="http://schemas.microsoft.com/office/powerpoint/2010/main" val="2724553790"/>
-      </p:ext>
-    </p:extLst>
-  </p:cSld>
-  <p:clrMapOvr>
-    <a:masterClrMapping/>
-  </p:clrMapOvr>
-</p:sld>
-</file>
-
-<file path=ppt/slides/slide30.xml><?xml version="1.0" encoding="utf-8"?>
-<p:sld xmlns:a="http://schemas.openxmlformats.org/drawingml/2006/main" xmlns:r="http://schemas.openxmlformats.org/officeDocument/2006/relationships" xmlns:p="http://schemas.openxmlformats.org/presentationml/2006/main">
-  <p:cSld>
-    <p:spTree>
-      <p:nvGrpSpPr>
-        <p:cNvPr id="1" name=""/>
-        <p:cNvGrpSpPr/>
-        <p:nvPr/>
-      </p:nvGrpSpPr>
-      <p:grpSpPr>
-        <a:xfrm>
-          <a:off x="0" y="0"/>
-          <a:ext cx="0" cy="0"/>
-          <a:chOff x="0" y="0"/>
-          <a:chExt cx="0" cy="0"/>
-        </a:xfrm>
-      </p:grpSpPr>
-      <p:sp>
-        <p:nvSpPr>
-          <p:cNvPr id="2" name="Title 1"/>
-          <p:cNvSpPr>
-            <a:spLocks noGrp="1"/>
-          </p:cNvSpPr>
-          <p:nvPr>
-            <p:ph type="title"/>
-          </p:nvPr>
-        </p:nvSpPr>
-        <p:spPr/>
-        <p:txBody>
-          <a:bodyPr/>
-          <a:lstStyle/>
-          <a:p>
-            <a:r>
-              <a:rPr lang="en-US" dirty="0" smtClean="0"/>
-              <a:t>Organize Content</a:t>
-            </a:r>
-            <a:endParaRPr lang="en-US" dirty="0"/>
-          </a:p>
-        </p:txBody>
-      </p:sp>
-      <p:sp>
-        <p:nvSpPr>
-          <p:cNvPr id="3" name="Content Placeholder 2"/>
-          <p:cNvSpPr>
-            <a:spLocks noGrp="1"/>
-          </p:cNvSpPr>
-          <p:nvPr>
-            <p:ph idx="1"/>
-          </p:nvPr>
-        </p:nvSpPr>
-        <p:spPr/>
-        <p:txBody>
-          <a:bodyPr/>
-          <a:lstStyle/>
-          <a:p>
-            <a:r>
-              <a:rPr lang="en-US" dirty="0" smtClean="0"/>
-              <a:t>Take chunks of content</a:t>
-            </a:r>
-          </a:p>
-          <a:p>
-            <a:r>
-              <a:rPr lang="en-US" dirty="0" smtClean="0"/>
-              <a:t>Organize into categories</a:t>
-            </a:r>
-          </a:p>
-          <a:p>
-            <a:r>
-              <a:rPr lang="en-US" dirty="0" smtClean="0"/>
-              <a:t>Update categories if need be</a:t>
-            </a:r>
-          </a:p>
-          <a:p>
-            <a:r>
-              <a:rPr lang="en-US" dirty="0" smtClean="0"/>
-              <a:t>Organize chunks of content into categories</a:t>
-            </a:r>
-          </a:p>
-          <a:p>
-            <a:r>
-              <a:rPr lang="en-US" dirty="0" smtClean="0"/>
-              <a:t>Repeat</a:t>
-            </a:r>
-            <a:endParaRPr lang="en-US" dirty="0"/>
-          </a:p>
-        </p:txBody>
-      </p:sp>
-    </p:spTree>
-    <p:extLst>
-      <p:ext uri="{BB962C8B-B14F-4D97-AF65-F5344CB8AC3E}">
-        <p14:creationId xmlns:p14="http://schemas.microsoft.com/office/powerpoint/2010/main" val="2619404490"/>
-      </p:ext>
-    </p:extLst>
-  </p:cSld>
-  <p:clrMapOvr>
-    <a:masterClrMapping/>
-  </p:clrMapOvr>
-</p:sld>
-</file>
-
 <file path=ppt/slides/slide31.xml><?xml version="1.0" encoding="utf-8"?>
 <p:sld xmlns:a="http://schemas.openxmlformats.org/drawingml/2006/main" xmlns:r="http://schemas.openxmlformats.org/officeDocument/2006/relationships" xmlns:p="http://schemas.openxmlformats.org/presentationml/2006/main">
   <p:cSld>
@@ -9814,7 +10061,7 @@
           <a:p>
             <a:r>
               <a:rPr lang="en-US" dirty="0" smtClean="0"/>
-              <a:t>Card Sorting</a:t>
+              <a:t>Navigation</a:t>
             </a:r>
             <a:endParaRPr lang="en-US" dirty="0"/>
           </a:p>
@@ -9832,73 +10079,38 @@
         </p:nvSpPr>
         <p:spPr/>
         <p:txBody>
-          <a:bodyPr>
-            <a:normAutofit lnSpcReduction="10000"/>
-          </a:bodyPr>
-          <a:lstStyle/>
-          <a:p>
-            <a:r>
-              <a:rPr lang="en-US" dirty="0" smtClean="0"/>
-              <a:t>Get a stack of 3x5 cards</a:t>
-            </a:r>
-          </a:p>
-          <a:p>
-            <a:r>
-              <a:rPr lang="en-US" dirty="0" smtClean="0"/>
-              <a:t>Create a card for each chunk of content</a:t>
-            </a:r>
-          </a:p>
-          <a:p>
-            <a:pPr lvl="1"/>
-            <a:r>
-              <a:rPr lang="en-US" dirty="0" smtClean="0"/>
-              <a:t>Title of content</a:t>
-            </a:r>
-          </a:p>
-          <a:p>
-            <a:pPr lvl="1"/>
-            <a:r>
-              <a:rPr lang="en-US" dirty="0" smtClean="0"/>
-              <a:t>Brief description of content</a:t>
-            </a:r>
-          </a:p>
-          <a:p>
-            <a:r>
-              <a:rPr lang="en-US" dirty="0" smtClean="0"/>
-              <a:t>Write down everything</a:t>
-            </a:r>
-          </a:p>
-          <a:p>
-            <a:r>
-              <a:rPr lang="en-US" dirty="0" smtClean="0"/>
-              <a:t>Write down stack names</a:t>
-            </a:r>
-          </a:p>
-          <a:p>
-            <a:r>
-              <a:rPr lang="en-US" dirty="0" smtClean="0"/>
-              <a:t>Sort cards into stacks</a:t>
-            </a:r>
-          </a:p>
-          <a:p>
-            <a:r>
-              <a:rPr lang="en-US" dirty="0" smtClean="0"/>
-              <a:t>Take a picture</a:t>
-            </a:r>
-          </a:p>
-          <a:p>
-            <a:r>
-              <a:rPr lang="en-US" dirty="0" smtClean="0"/>
-              <a:t>Repeat</a:t>
-            </a:r>
-            <a:endParaRPr lang="en-US" dirty="0"/>
+          <a:bodyPr/>
+          <a:lstStyle/>
+          <a:p>
+            <a:r>
+              <a:rPr lang="en-US" dirty="0" smtClean="0"/>
+              <a:t>Users are impatient</a:t>
+            </a:r>
+          </a:p>
+          <a:p>
+            <a:r>
+              <a:rPr lang="en-US" dirty="0" smtClean="0"/>
+              <a:t>Google increased page load from .4 to .9 and lost 20% traffic</a:t>
+            </a:r>
+          </a:p>
+          <a:p>
+            <a:r>
+              <a:rPr lang="en-US" dirty="0" smtClean="0"/>
+              <a:t>If they can't find their way around your website, they will leave</a:t>
+            </a:r>
+          </a:p>
+          <a:p>
+            <a:r>
+              <a:rPr lang="en-US" dirty="0" smtClean="0"/>
+              <a:t>Navigation is key to answering this impatience</a:t>
+            </a:r>
           </a:p>
         </p:txBody>
       </p:sp>
     </p:spTree>
     <p:extLst>
       <p:ext uri="{BB962C8B-B14F-4D97-AF65-F5344CB8AC3E}">
-        <p14:creationId xmlns:p14="http://schemas.microsoft.com/office/powerpoint/2010/main" val="3687906851"/>
+        <p14:creationId xmlns:p14="http://schemas.microsoft.com/office/powerpoint/2010/main" val="584142683"/>
       </p:ext>
     </p:extLst>
   </p:cSld>
@@ -9942,7 +10154,7 @@
           <a:p>
             <a:r>
               <a:rPr lang="en-US" dirty="0" smtClean="0"/>
-              <a:t>Card Sort Hierarchy</a:t>
+              <a:t>Organize Content</a:t>
             </a:r>
             <a:endParaRPr lang="en-US" dirty="0"/>
           </a:p>
@@ -9965,31 +10177,31 @@
           <a:p>
             <a:r>
               <a:rPr lang="en-US" dirty="0" smtClean="0"/>
-              <a:t>Pick the sort you like best</a:t>
-            </a:r>
-          </a:p>
-          <a:p>
-            <a:r>
-              <a:rPr lang="en-US" dirty="0" smtClean="0"/>
-              <a:t>Create "Homepage" card</a:t>
-            </a:r>
-          </a:p>
-          <a:p>
-            <a:r>
-              <a:rPr lang="en-US" dirty="0" smtClean="0"/>
-              <a:t>Move stack name cards to main navigation</a:t>
-            </a:r>
-          </a:p>
-          <a:p>
-            <a:r>
-              <a:rPr lang="en-US" dirty="0" smtClean="0"/>
-              <a:t>Move remaining cards below stacks</a:t>
-            </a:r>
-          </a:p>
-          <a:p>
-            <a:r>
-              <a:rPr lang="en-US" dirty="0" smtClean="0"/>
-              <a:t>Organize cards</a:t>
+              <a:t>Take chunks of content</a:t>
+            </a:r>
+          </a:p>
+          <a:p>
+            <a:r>
+              <a:rPr lang="en-US" dirty="0" smtClean="0"/>
+              <a:t>Organize into categories</a:t>
+            </a:r>
+          </a:p>
+          <a:p>
+            <a:r>
+              <a:rPr lang="en-US" dirty="0" smtClean="0"/>
+              <a:t>Update categories if need be</a:t>
+            </a:r>
+          </a:p>
+          <a:p>
+            <a:r>
+              <a:rPr lang="en-US" dirty="0" smtClean="0"/>
+              <a:t>Organize chunks of content into categories</a:t>
+            </a:r>
+          </a:p>
+          <a:p>
+            <a:r>
+              <a:rPr lang="en-US" dirty="0" smtClean="0"/>
+              <a:t>Repeat</a:t>
             </a:r>
             <a:endParaRPr lang="en-US" dirty="0"/>
           </a:p>
@@ -9998,7 +10210,7 @@
     </p:spTree>
     <p:extLst>
       <p:ext uri="{BB962C8B-B14F-4D97-AF65-F5344CB8AC3E}">
-        <p14:creationId xmlns:p14="http://schemas.microsoft.com/office/powerpoint/2010/main" val="4183314552"/>
+        <p14:creationId xmlns:p14="http://schemas.microsoft.com/office/powerpoint/2010/main" val="2619404490"/>
       </p:ext>
     </p:extLst>
   </p:cSld>
@@ -10041,6 +10253,234 @@
           <a:lstStyle/>
           <a:p>
             <a:r>
+              <a:rPr lang="en-US" dirty="0" smtClean="0"/>
+              <a:t>Card Sorting</a:t>
+            </a:r>
+            <a:endParaRPr lang="en-US" dirty="0"/>
+          </a:p>
+        </p:txBody>
+      </p:sp>
+      <p:sp>
+        <p:nvSpPr>
+          <p:cNvPr id="3" name="Content Placeholder 2"/>
+          <p:cNvSpPr>
+            <a:spLocks noGrp="1"/>
+          </p:cNvSpPr>
+          <p:nvPr>
+            <p:ph idx="1"/>
+          </p:nvPr>
+        </p:nvSpPr>
+        <p:spPr/>
+        <p:txBody>
+          <a:bodyPr>
+            <a:normAutofit lnSpcReduction="10000"/>
+          </a:bodyPr>
+          <a:lstStyle/>
+          <a:p>
+            <a:r>
+              <a:rPr lang="en-US" dirty="0" smtClean="0"/>
+              <a:t>Get a stack of 3x5 cards</a:t>
+            </a:r>
+          </a:p>
+          <a:p>
+            <a:r>
+              <a:rPr lang="en-US" dirty="0" smtClean="0"/>
+              <a:t>Create a card for each chunk of content</a:t>
+            </a:r>
+          </a:p>
+          <a:p>
+            <a:pPr lvl="1"/>
+            <a:r>
+              <a:rPr lang="en-US" dirty="0" smtClean="0"/>
+              <a:t>Title of content</a:t>
+            </a:r>
+          </a:p>
+          <a:p>
+            <a:pPr lvl="1"/>
+            <a:r>
+              <a:rPr lang="en-US" dirty="0" smtClean="0"/>
+              <a:t>Brief description of content</a:t>
+            </a:r>
+          </a:p>
+          <a:p>
+            <a:r>
+              <a:rPr lang="en-US" dirty="0" smtClean="0"/>
+              <a:t>Write down everything</a:t>
+            </a:r>
+          </a:p>
+          <a:p>
+            <a:r>
+              <a:rPr lang="en-US" dirty="0" smtClean="0"/>
+              <a:t>Write down stack names</a:t>
+            </a:r>
+          </a:p>
+          <a:p>
+            <a:r>
+              <a:rPr lang="en-US" dirty="0" smtClean="0"/>
+              <a:t>Sort cards into stacks</a:t>
+            </a:r>
+          </a:p>
+          <a:p>
+            <a:r>
+              <a:rPr lang="en-US" dirty="0" smtClean="0"/>
+              <a:t>Take a picture</a:t>
+            </a:r>
+          </a:p>
+          <a:p>
+            <a:r>
+              <a:rPr lang="en-US" dirty="0" smtClean="0"/>
+              <a:t>Repeat</a:t>
+            </a:r>
+            <a:endParaRPr lang="en-US" dirty="0"/>
+          </a:p>
+        </p:txBody>
+      </p:sp>
+    </p:spTree>
+    <p:extLst>
+      <p:ext uri="{BB962C8B-B14F-4D97-AF65-F5344CB8AC3E}">
+        <p14:creationId xmlns:p14="http://schemas.microsoft.com/office/powerpoint/2010/main" val="3687906851"/>
+      </p:ext>
+    </p:extLst>
+  </p:cSld>
+  <p:clrMapOvr>
+    <a:masterClrMapping/>
+  </p:clrMapOvr>
+</p:sld>
+</file>
+
+<file path=ppt/slides/slide34.xml><?xml version="1.0" encoding="utf-8"?>
+<p:sld xmlns:a="http://schemas.openxmlformats.org/drawingml/2006/main" xmlns:r="http://schemas.openxmlformats.org/officeDocument/2006/relationships" xmlns:p="http://schemas.openxmlformats.org/presentationml/2006/main">
+  <p:cSld>
+    <p:spTree>
+      <p:nvGrpSpPr>
+        <p:cNvPr id="1" name=""/>
+        <p:cNvGrpSpPr/>
+        <p:nvPr/>
+      </p:nvGrpSpPr>
+      <p:grpSpPr>
+        <a:xfrm>
+          <a:off x="0" y="0"/>
+          <a:ext cx="0" cy="0"/>
+          <a:chOff x="0" y="0"/>
+          <a:chExt cx="0" cy="0"/>
+        </a:xfrm>
+      </p:grpSpPr>
+      <p:sp>
+        <p:nvSpPr>
+          <p:cNvPr id="2" name="Title 1"/>
+          <p:cNvSpPr>
+            <a:spLocks noGrp="1"/>
+          </p:cNvSpPr>
+          <p:nvPr>
+            <p:ph type="title"/>
+          </p:nvPr>
+        </p:nvSpPr>
+        <p:spPr/>
+        <p:txBody>
+          <a:bodyPr/>
+          <a:lstStyle/>
+          <a:p>
+            <a:r>
+              <a:rPr lang="en-US" dirty="0" smtClean="0"/>
+              <a:t>Card Sort Hierarchy</a:t>
+            </a:r>
+            <a:endParaRPr lang="en-US" dirty="0"/>
+          </a:p>
+        </p:txBody>
+      </p:sp>
+      <p:sp>
+        <p:nvSpPr>
+          <p:cNvPr id="3" name="Content Placeholder 2"/>
+          <p:cNvSpPr>
+            <a:spLocks noGrp="1"/>
+          </p:cNvSpPr>
+          <p:nvPr>
+            <p:ph idx="1"/>
+          </p:nvPr>
+        </p:nvSpPr>
+        <p:spPr/>
+        <p:txBody>
+          <a:bodyPr/>
+          <a:lstStyle/>
+          <a:p>
+            <a:r>
+              <a:rPr lang="en-US" dirty="0" smtClean="0"/>
+              <a:t>Pick the sort you like best</a:t>
+            </a:r>
+          </a:p>
+          <a:p>
+            <a:r>
+              <a:rPr lang="en-US" dirty="0" smtClean="0"/>
+              <a:t>Create "Homepage" card</a:t>
+            </a:r>
+          </a:p>
+          <a:p>
+            <a:r>
+              <a:rPr lang="en-US" dirty="0" smtClean="0"/>
+              <a:t>Move stack name cards to main navigation</a:t>
+            </a:r>
+          </a:p>
+          <a:p>
+            <a:r>
+              <a:rPr lang="en-US" dirty="0" smtClean="0"/>
+              <a:t>Move remaining cards below stacks</a:t>
+            </a:r>
+          </a:p>
+          <a:p>
+            <a:r>
+              <a:rPr lang="en-US" dirty="0" smtClean="0"/>
+              <a:t>Organize cards</a:t>
+            </a:r>
+            <a:endParaRPr lang="en-US" dirty="0"/>
+          </a:p>
+        </p:txBody>
+      </p:sp>
+    </p:spTree>
+    <p:extLst>
+      <p:ext uri="{BB962C8B-B14F-4D97-AF65-F5344CB8AC3E}">
+        <p14:creationId xmlns:p14="http://schemas.microsoft.com/office/powerpoint/2010/main" val="4183314552"/>
+      </p:ext>
+    </p:extLst>
+  </p:cSld>
+  <p:clrMapOvr>
+    <a:masterClrMapping/>
+  </p:clrMapOvr>
+</p:sld>
+</file>
+
+<file path=ppt/slides/slide35.xml><?xml version="1.0" encoding="utf-8"?>
+<p:sld xmlns:a="http://schemas.openxmlformats.org/drawingml/2006/main" xmlns:r="http://schemas.openxmlformats.org/officeDocument/2006/relationships" xmlns:p="http://schemas.openxmlformats.org/presentationml/2006/main">
+  <p:cSld>
+    <p:spTree>
+      <p:nvGrpSpPr>
+        <p:cNvPr id="1" name=""/>
+        <p:cNvGrpSpPr/>
+        <p:nvPr/>
+      </p:nvGrpSpPr>
+      <p:grpSpPr>
+        <a:xfrm>
+          <a:off x="0" y="0"/>
+          <a:ext cx="0" cy="0"/>
+          <a:chOff x="0" y="0"/>
+          <a:chExt cx="0" cy="0"/>
+        </a:xfrm>
+      </p:grpSpPr>
+      <p:sp>
+        <p:nvSpPr>
+          <p:cNvPr id="2" name="Title 1"/>
+          <p:cNvSpPr>
+            <a:spLocks noGrp="1"/>
+          </p:cNvSpPr>
+          <p:nvPr>
+            <p:ph type="title"/>
+          </p:nvPr>
+        </p:nvSpPr>
+        <p:spPr/>
+        <p:txBody>
+          <a:bodyPr/>
+          <a:lstStyle/>
+          <a:p>
+            <a:r>
               <a:rPr lang="en-US" smtClean="0"/>
               <a:t>Exercise</a:t>
             </a:r>
@@ -10100,13 +10540,7 @@
               <a:rPr lang="en-US" dirty="0" smtClean="0">
                 <a:hlinkClick r:id="rId3"/>
               </a:rPr>
-              <a:t>http://www.lucidchart.com</a:t>
-            </a:r>
-            <a:r>
-              <a:rPr lang="en-US" dirty="0" smtClean="0">
-                <a:hlinkClick r:id="rId3"/>
-              </a:rPr>
-              <a:t>/</a:t>
+              <a:t>http://www.lucidchart.com/</a:t>
             </a:r>
             <a:endParaRPr lang="en-US" dirty="0" smtClean="0"/>
           </a:p>
@@ -10136,7 +10570,6 @@
               <a:rPr lang="en-US" dirty="0" smtClean="0"/>
               <a:t>Or use Microsoft Word or PowerPoint</a:t>
             </a:r>
-            <a:endParaRPr lang="en-US" dirty="0" smtClean="0"/>
           </a:p>
           <a:p>
             <a:r>
@@ -10160,7 +10593,7 @@
 </p:sld>
 </file>
 
-<file path=ppt/slides/slide34.xml><?xml version="1.0" encoding="utf-8"?>
+<file path=ppt/slides/slide36.xml><?xml version="1.0" encoding="utf-8"?>
 <p:sld xmlns:a="http://schemas.openxmlformats.org/drawingml/2006/main" xmlns:r="http://schemas.openxmlformats.org/officeDocument/2006/relationships" xmlns:p="http://schemas.openxmlformats.org/presentationml/2006/main">
   <p:cSld>
     <p:spTree>
@@ -10317,16 +10750,61 @@
           <a:p>
             <a:r>
               <a:rPr lang="en-US" dirty="0" smtClean="0"/>
-              <a:t>Quiz Time</a:t>
+              <a:t>Review - Brainstorming</a:t>
             </a:r>
             <a:endParaRPr lang="en-US" dirty="0"/>
+          </a:p>
+        </p:txBody>
+      </p:sp>
+      <p:sp>
+        <p:nvSpPr>
+          <p:cNvPr id="3" name="Content Placeholder 2"/>
+          <p:cNvSpPr>
+            <a:spLocks noGrp="1"/>
+          </p:cNvSpPr>
+          <p:nvPr>
+            <p:ph idx="1"/>
+          </p:nvPr>
+        </p:nvSpPr>
+        <p:spPr/>
+        <p:txBody>
+          <a:bodyPr/>
+          <a:lstStyle/>
+          <a:p>
+            <a:r>
+              <a:rPr lang="en-US" dirty="0" smtClean="0"/>
+              <a:t>Helps develop visual metaphor</a:t>
+            </a:r>
+          </a:p>
+          <a:p>
+            <a:r>
+              <a:rPr lang="en-US" dirty="0" smtClean="0"/>
+              <a:t>Free-flow writing of ideas and thoughts</a:t>
+            </a:r>
+          </a:p>
+          <a:p>
+            <a:r>
+              <a:rPr lang="en-US" dirty="0" smtClean="0"/>
+              <a:t>Don't hold back; write everything</a:t>
+            </a:r>
+          </a:p>
+          <a:p>
+            <a:r>
+              <a:rPr lang="en-US" dirty="0" smtClean="0"/>
+              <a:t>Can be done several times for </a:t>
+            </a:r>
+            <a:r>
+              <a:rPr lang="en-US" smtClean="0"/>
+              <a:t>one project</a:t>
+            </a:r>
+            <a:endParaRPr lang="en-US"/>
           </a:p>
         </p:txBody>
       </p:sp>
     </p:spTree>
     <p:extLst>
       <p:ext uri="{BB962C8B-B14F-4D97-AF65-F5344CB8AC3E}">
-        <p14:creationId xmlns:p14="http://schemas.microsoft.com/office/powerpoint/2010/main" val="2813428287"/>
+        <p14:creationId xmlns:p14="http://schemas.microsoft.com/office/powerpoint/2010/main" val="272748499"/>
       </p:ext>
     </p:extLst>
   </p:cSld>
@@ -10377,7 +10855,7 @@
           <a:p>
             <a:r>
               <a:rPr lang="en-US" dirty="0" smtClean="0"/>
-              <a:t>Website Autopsy</a:t>
+              <a:t>Review - Activity</a:t>
             </a:r>
             <a:endParaRPr lang="en-US" dirty="0"/>
           </a:p>
@@ -10395,11 +10873,61 @@
         </p:nvSpPr>
         <p:spPr/>
         <p:txBody>
-          <a:bodyPr>
-            <a:normAutofit/>
-          </a:bodyPr>
-          <a:lstStyle/>
-          <a:p>
+          <a:bodyPr/>
+          <a:lstStyle/>
+          <a:p>
+            <a:r>
+              <a:rPr lang="en-US" dirty="0" smtClean="0"/>
+              <a:t>Theme</a:t>
+            </a:r>
+          </a:p>
+          <a:p>
+            <a:pPr lvl="1"/>
+            <a:r>
+              <a:rPr lang="en-US" dirty="0" smtClean="0"/>
+              <a:t>What is the purpose?</a:t>
+            </a:r>
+          </a:p>
+          <a:p>
+            <a:pPr lvl="1"/>
+            <a:r>
+              <a:rPr lang="en-US" dirty="0" smtClean="0"/>
+              <a:t>What is the content?</a:t>
+            </a:r>
+          </a:p>
+          <a:p>
+            <a:pPr lvl="1"/>
+            <a:r>
+              <a:rPr lang="en-US" dirty="0" smtClean="0"/>
+              <a:t>Make it a complete sentence</a:t>
+            </a:r>
+          </a:p>
+          <a:p>
+            <a:r>
+              <a:rPr lang="en-US" dirty="0" smtClean="0"/>
+              <a:t>Brainstorming</a:t>
+            </a:r>
+          </a:p>
+          <a:p>
+            <a:pPr lvl="1"/>
+            <a:r>
+              <a:rPr lang="en-US" dirty="0" smtClean="0"/>
+              <a:t>Start with a word</a:t>
+            </a:r>
+          </a:p>
+          <a:p>
+            <a:pPr lvl="1"/>
+            <a:r>
+              <a:rPr lang="en-US" dirty="0" smtClean="0"/>
+              <a:t>Write another word</a:t>
+            </a:r>
+          </a:p>
+          <a:p>
+            <a:pPr lvl="1"/>
+            <a:r>
+              <a:rPr lang="en-US" dirty="0" smtClean="0"/>
+              <a:t>Repeat</a:t>
+            </a:r>
             <a:endParaRPr lang="en-US" dirty="0"/>
           </a:p>
         </p:txBody>
@@ -10407,20 +10935,13 @@
     </p:spTree>
     <p:extLst>
       <p:ext uri="{BB962C8B-B14F-4D97-AF65-F5344CB8AC3E}">
-        <p14:creationId xmlns:p14="http://schemas.microsoft.com/office/powerpoint/2010/main" val="2577880583"/>
+        <p14:creationId xmlns:p14="http://schemas.microsoft.com/office/powerpoint/2010/main" val="2724553790"/>
       </p:ext>
     </p:extLst>
   </p:cSld>
   <p:clrMapOvr>
     <a:masterClrMapping/>
   </p:clrMapOvr>
-  <p:timing>
-    <p:tnLst>
-      <p:par>
-        <p:cTn xmlns:p14="http://schemas.microsoft.com/office/powerpoint/2010/main" id="1" dur="indefinite" restart="never" nodeType="tmRoot"/>
-      </p:par>
-    </p:tnLst>
-  </p:timing>
 </p:sld>
 </file>
 
@@ -10458,7 +10979,7 @@
           <a:p>
             <a:r>
               <a:rPr lang="en-US" dirty="0" smtClean="0"/>
-              <a:t>Lesson: CSS Layout</a:t>
+              <a:t>Quiz Time</a:t>
             </a:r>
             <a:endParaRPr lang="en-US" dirty="0"/>
           </a:p>
@@ -10467,7 +10988,7 @@
     </p:spTree>
     <p:extLst>
       <p:ext uri="{BB962C8B-B14F-4D97-AF65-F5344CB8AC3E}">
-        <p14:creationId xmlns:p14="http://schemas.microsoft.com/office/powerpoint/2010/main" val="2418307096"/>
+        <p14:creationId xmlns:p14="http://schemas.microsoft.com/office/powerpoint/2010/main" val="2813428287"/>
       </p:ext>
     </p:extLst>
   </p:cSld>
@@ -10518,7 +11039,7 @@
           <a:p>
             <a:r>
               <a:rPr lang="en-US" dirty="0" smtClean="0"/>
-              <a:t>Layout</a:t>
+              <a:t>Website Autopsy</a:t>
             </a:r>
             <a:endParaRPr lang="en-US" dirty="0"/>
           </a:p>
@@ -10537,117 +11058,41 @@
         <p:spPr/>
         <p:txBody>
           <a:bodyPr>
-            <a:normAutofit fontScale="62500" lnSpcReduction="20000"/>
+            <a:normAutofit/>
           </a:bodyPr>
           <a:lstStyle/>
           <a:p>
             <a:r>
               <a:rPr lang="en-US" dirty="0" smtClean="0"/>
-              <a:t>display</a:t>
-            </a:r>
-          </a:p>
-          <a:p>
-            <a:r>
-              <a:rPr lang="en-US" dirty="0"/>
-              <a:t>list-</a:t>
-            </a:r>
-            <a:r>
-              <a:rPr lang="en-US" dirty="0" smtClean="0"/>
-              <a:t>style</a:t>
-            </a:r>
-          </a:p>
-          <a:p>
-            <a:r>
-              <a:rPr lang="en-US" dirty="0" smtClean="0"/>
-              <a:t>position</a:t>
-            </a:r>
-          </a:p>
-          <a:p>
-            <a:r>
-              <a:rPr lang="en-US" dirty="0" smtClean="0"/>
-              <a:t>top</a:t>
-            </a:r>
-            <a:r>
-              <a:rPr lang="en-US" dirty="0"/>
-              <a:t>, left, right, </a:t>
-            </a:r>
-            <a:r>
-              <a:rPr lang="en-US" dirty="0" smtClean="0"/>
-              <a:t>bottom</a:t>
-            </a:r>
-          </a:p>
-          <a:p>
-            <a:r>
-              <a:rPr lang="en-US" dirty="0"/>
-              <a:t>z-</a:t>
-            </a:r>
-            <a:r>
-              <a:rPr lang="en-US" dirty="0" smtClean="0"/>
-              <a:t>index</a:t>
-            </a:r>
-          </a:p>
-          <a:p>
-            <a:r>
-              <a:rPr lang="en-US" dirty="0" smtClean="0"/>
-              <a:t>float</a:t>
-            </a:r>
-          </a:p>
-          <a:p>
-            <a:r>
-              <a:rPr lang="en-US" dirty="0" smtClean="0"/>
-              <a:t>clear</a:t>
-            </a:r>
-          </a:p>
-          <a:p>
-            <a:r>
-              <a:rPr lang="en-US" dirty="0" smtClean="0"/>
-              <a:t>width, min-width, max-width</a:t>
-            </a:r>
-          </a:p>
-          <a:p>
-            <a:r>
-              <a:rPr lang="en-US" dirty="0" smtClean="0"/>
-              <a:t>height, min-height, max-height</a:t>
-            </a:r>
-          </a:p>
-          <a:p>
-            <a:r>
-              <a:rPr lang="en-US" dirty="0" smtClean="0"/>
-              <a:t>overflow</a:t>
-            </a:r>
-          </a:p>
-          <a:p>
-            <a:r>
-              <a:rPr lang="en-US" dirty="0" smtClean="0"/>
-              <a:t>vertical-align</a:t>
-            </a:r>
-          </a:p>
-          <a:p>
-            <a:r>
-              <a:rPr lang="en-US" dirty="0"/>
-              <a:t>padding</a:t>
+              <a:t>Miles - </a:t>
+            </a:r>
+            <a:r>
+              <a:rPr lang="en-US" dirty="0" smtClean="0">
+                <a:hlinkClick r:id="rId3"/>
+              </a:rPr>
+              <a:t>http://thewildernessdowntown.com/</a:t>
             </a:r>
             <a:endParaRPr lang="en-US" dirty="0" smtClean="0"/>
           </a:p>
           <a:p>
             <a:r>
               <a:rPr lang="en-US" dirty="0" smtClean="0"/>
-              <a:t>border</a:t>
+              <a:t>Hannah - </a:t>
+            </a:r>
+            <a:r>
+              <a:rPr lang="en-US" dirty="0" smtClean="0">
+                <a:hlinkClick r:id="rId4"/>
+              </a:rPr>
+              <a:t>http://www.dakotachiropractic.com/</a:t>
             </a:r>
             <a:endParaRPr lang="en-US" dirty="0"/>
-          </a:p>
-          <a:p>
-            <a:r>
-              <a:rPr lang="en-US" dirty="0" smtClean="0"/>
-              <a:t>margin</a:t>
-            </a:r>
           </a:p>
         </p:txBody>
       </p:sp>
     </p:spTree>
     <p:extLst>
       <p:ext uri="{BB962C8B-B14F-4D97-AF65-F5344CB8AC3E}">
-        <p14:creationId xmlns:p14="http://schemas.microsoft.com/office/powerpoint/2010/main" val="1293711312"/>
+        <p14:creationId xmlns:p14="http://schemas.microsoft.com/office/powerpoint/2010/main" val="2577880583"/>
       </p:ext>
     </p:extLst>
   </p:cSld>
@@ -10698,98 +11143,29 @@
           <a:p>
             <a:r>
               <a:rPr lang="en-US" dirty="0" smtClean="0"/>
-              <a:t>display</a:t>
+              <a:t>Lesson: CSS Layout</a:t>
             </a:r>
             <a:endParaRPr lang="en-US" dirty="0"/>
-          </a:p>
-        </p:txBody>
-      </p:sp>
-      <p:sp>
-        <p:nvSpPr>
-          <p:cNvPr id="3" name="Content Placeholder 2"/>
-          <p:cNvSpPr>
-            <a:spLocks noGrp="1"/>
-          </p:cNvSpPr>
-          <p:nvPr>
-            <p:ph idx="1"/>
-          </p:nvPr>
-        </p:nvSpPr>
-        <p:spPr/>
-        <p:txBody>
-          <a:bodyPr/>
-          <a:lstStyle/>
-          <a:p>
-            <a:r>
-              <a:rPr lang="en-US" dirty="0" smtClean="0"/>
-              <a:t>Learn more: </a:t>
-            </a:r>
-            <a:r>
-              <a:rPr lang="en-US" dirty="0" smtClean="0">
-                <a:hlinkClick r:id="rId2"/>
-              </a:rPr>
-              <a:t>http://www.w3.org/TR/CSS21/visuren.html - propdef-display</a:t>
-            </a:r>
-            <a:endParaRPr lang="en-US" dirty="0" smtClean="0"/>
-          </a:p>
-          <a:p>
-            <a:r>
-              <a:rPr lang="en-US" dirty="0" smtClean="0"/>
-              <a:t>Sets the type of a box an element lives in</a:t>
-            </a:r>
-          </a:p>
-          <a:p>
-            <a:r>
-              <a:rPr lang="en-US" dirty="0" smtClean="0"/>
-              <a:t>Can be inline, block, list-item, inline-block, none</a:t>
-            </a:r>
-          </a:p>
-          <a:p>
-            <a:r>
-              <a:rPr lang="en-US" sz="2000" dirty="0" smtClean="0">
-                <a:latin typeface="Courier New"/>
-                <a:cs typeface="Courier New"/>
-              </a:rPr>
-              <a:t>display: block;</a:t>
-            </a:r>
-          </a:p>
-          <a:p>
-            <a:endParaRPr lang="en-US" dirty="0"/>
-          </a:p>
-        </p:txBody>
-      </p:sp>
-      <p:sp>
-        <p:nvSpPr>
-          <p:cNvPr id="4" name="Footer Placeholder 3"/>
-          <p:cNvSpPr>
-            <a:spLocks noGrp="1"/>
-          </p:cNvSpPr>
-          <p:nvPr>
-            <p:ph type="ftr" sz="quarter" idx="11"/>
-          </p:nvPr>
-        </p:nvSpPr>
-        <p:spPr/>
-        <p:txBody>
-          <a:bodyPr/>
-          <a:lstStyle/>
-          <a:p>
-            <a:r>
-              <a:rPr lang="en-US" smtClean="0"/>
-              <a:t>http://dl.dropbox.com/u/41609448/art329/slides/classfive/slides/display/index.html  </a:t>
-            </a:r>
-            <a:endParaRPr lang="en-US"/>
           </a:p>
         </p:txBody>
       </p:sp>
     </p:spTree>
     <p:extLst>
       <p:ext uri="{BB962C8B-B14F-4D97-AF65-F5344CB8AC3E}">
-        <p14:creationId xmlns:p14="http://schemas.microsoft.com/office/powerpoint/2010/main" val="103994896"/>
+        <p14:creationId xmlns:p14="http://schemas.microsoft.com/office/powerpoint/2010/main" val="2418307096"/>
       </p:ext>
     </p:extLst>
   </p:cSld>
   <p:clrMapOvr>
     <a:masterClrMapping/>
   </p:clrMapOvr>
+  <p:timing>
+    <p:tnLst>
+      <p:par>
+        <p:cTn xmlns:p14="http://schemas.microsoft.com/office/powerpoint/2010/main" id="1" dur="indefinite" restart="never" nodeType="tmRoot"/>
+      </p:par>
+    </p:tnLst>
+  </p:timing>
 </p:sld>
 </file>
 
@@ -10827,7 +11203,7 @@
           <a:p>
             <a:r>
               <a:rPr lang="en-US" dirty="0" smtClean="0"/>
-              <a:t>list-style</a:t>
+              <a:t>Layout</a:t>
             </a:r>
             <a:endParaRPr lang="en-US" dirty="0"/>
           </a:p>
@@ -10846,233 +11222,130 @@
         <p:spPr/>
         <p:txBody>
           <a:bodyPr>
-            <a:normAutofit fontScale="85000" lnSpcReduction="20000"/>
+            <a:normAutofit fontScale="62500" lnSpcReduction="20000"/>
           </a:bodyPr>
           <a:lstStyle/>
           <a:p>
             <a:r>
               <a:rPr lang="en-US" dirty="0" smtClean="0"/>
-              <a:t>Learn more: </a:t>
-            </a:r>
-            <a:r>
-              <a:rPr lang="en-US" dirty="0" smtClean="0">
-                <a:hlinkClick r:id="rId2"/>
-              </a:rPr>
-              <a:t>http://www.w3.org/TR/CSS21/generate.html - propdef-list-style</a:t>
+              <a:t>display</a:t>
+            </a:r>
+          </a:p>
+          <a:p>
+            <a:r>
+              <a:rPr lang="en-US" dirty="0"/>
+              <a:t>list-</a:t>
+            </a:r>
+            <a:r>
+              <a:rPr lang="en-US" dirty="0" smtClean="0"/>
+              <a:t>style</a:t>
+            </a:r>
+          </a:p>
+          <a:p>
+            <a:r>
+              <a:rPr lang="en-US" dirty="0" smtClean="0"/>
+              <a:t>position</a:t>
+            </a:r>
+          </a:p>
+          <a:p>
+            <a:r>
+              <a:rPr lang="en-US" dirty="0" smtClean="0"/>
+              <a:t>top</a:t>
+            </a:r>
+            <a:r>
+              <a:rPr lang="en-US" dirty="0"/>
+              <a:t>, left, right, </a:t>
+            </a:r>
+            <a:r>
+              <a:rPr lang="en-US" dirty="0" smtClean="0"/>
+              <a:t>bottom</a:t>
+            </a:r>
+          </a:p>
+          <a:p>
+            <a:r>
+              <a:rPr lang="en-US" dirty="0"/>
+              <a:t>z-</a:t>
+            </a:r>
+            <a:r>
+              <a:rPr lang="en-US" dirty="0" smtClean="0"/>
+              <a:t>index</a:t>
+            </a:r>
+          </a:p>
+          <a:p>
+            <a:r>
+              <a:rPr lang="en-US" dirty="0" smtClean="0"/>
+              <a:t>float</a:t>
+            </a:r>
+          </a:p>
+          <a:p>
+            <a:r>
+              <a:rPr lang="en-US" dirty="0" smtClean="0"/>
+              <a:t>clear</a:t>
+            </a:r>
+          </a:p>
+          <a:p>
+            <a:r>
+              <a:rPr lang="en-US" dirty="0" smtClean="0"/>
+              <a:t>width, min-width, max-width</a:t>
+            </a:r>
+          </a:p>
+          <a:p>
+            <a:r>
+              <a:rPr lang="en-US" dirty="0" smtClean="0"/>
+              <a:t>height, min-height, max-height</a:t>
+            </a:r>
+          </a:p>
+          <a:p>
+            <a:r>
+              <a:rPr lang="en-US" dirty="0" smtClean="0"/>
+              <a:t>overflow</a:t>
+            </a:r>
+          </a:p>
+          <a:p>
+            <a:r>
+              <a:rPr lang="en-US" dirty="0" smtClean="0"/>
+              <a:t>vertical-align</a:t>
+            </a:r>
+          </a:p>
+          <a:p>
+            <a:r>
+              <a:rPr lang="en-US" dirty="0"/>
+              <a:t>padding</a:t>
             </a:r>
             <a:endParaRPr lang="en-US" dirty="0" smtClean="0"/>
           </a:p>
           <a:p>
             <a:r>
               <a:rPr lang="en-US" dirty="0" smtClean="0"/>
-              <a:t>Sets the style properties of the list: type, position, image</a:t>
-            </a:r>
-          </a:p>
-          <a:p>
-            <a:r>
-              <a:rPr lang="en-US" dirty="0" smtClean="0"/>
-              <a:t>list-style</a:t>
-            </a:r>
-            <a:r>
-              <a:rPr lang="en-US" dirty="0"/>
-              <a:t>-type: </a:t>
-            </a:r>
-            <a:r>
-              <a:rPr lang="en-US" dirty="0" smtClean="0"/>
-              <a:t>disc, circle, square, decimal, </a:t>
-            </a:r>
-            <a:r>
-              <a:rPr lang="en-US" dirty="0"/>
-              <a:t>decimal-leading-</a:t>
-            </a:r>
-            <a:r>
-              <a:rPr lang="en-US" dirty="0" smtClean="0"/>
-              <a:t>zero, </a:t>
-            </a:r>
-            <a:r>
-              <a:rPr lang="en-US" dirty="0"/>
-              <a:t>lower-</a:t>
-            </a:r>
-            <a:r>
-              <a:rPr lang="en-US" dirty="0" smtClean="0"/>
-              <a:t>roman, </a:t>
-            </a:r>
-            <a:r>
-              <a:rPr lang="en-US" dirty="0"/>
-              <a:t>upper-</a:t>
-            </a:r>
-            <a:r>
-              <a:rPr lang="en-US" dirty="0" smtClean="0"/>
-              <a:t>roman, </a:t>
-            </a:r>
-            <a:r>
-              <a:rPr lang="en-US" dirty="0"/>
-              <a:t>lower-</a:t>
-            </a:r>
-            <a:r>
-              <a:rPr lang="en-US" dirty="0" err="1" smtClean="0"/>
-              <a:t>greek</a:t>
-            </a:r>
-            <a:r>
-              <a:rPr lang="en-US" dirty="0" smtClean="0"/>
-              <a:t>, lower-</a:t>
-            </a:r>
-            <a:r>
-              <a:rPr lang="en-US" dirty="0" err="1" smtClean="0"/>
-              <a:t>latin</a:t>
-            </a:r>
-            <a:r>
-              <a:rPr lang="en-US" dirty="0"/>
-              <a:t>,</a:t>
-            </a:r>
-            <a:r>
-              <a:rPr lang="en-US" dirty="0" smtClean="0"/>
-              <a:t> upper-</a:t>
-            </a:r>
-            <a:r>
-              <a:rPr lang="en-US" dirty="0" err="1" smtClean="0"/>
-              <a:t>latin</a:t>
-            </a:r>
-            <a:r>
-              <a:rPr lang="en-US" dirty="0"/>
-              <a:t>,</a:t>
-            </a:r>
-            <a:r>
-              <a:rPr lang="en-US" dirty="0" smtClean="0"/>
-              <a:t> </a:t>
-            </a:r>
-            <a:r>
-              <a:rPr lang="en-US" dirty="0" err="1" smtClean="0"/>
-              <a:t>armenian</a:t>
-            </a:r>
-            <a:r>
-              <a:rPr lang="en-US" dirty="0"/>
-              <a:t>,</a:t>
-            </a:r>
-            <a:r>
-              <a:rPr lang="en-US" dirty="0" smtClean="0"/>
-              <a:t> </a:t>
-            </a:r>
-            <a:r>
-              <a:rPr lang="en-US" dirty="0" err="1" smtClean="0"/>
-              <a:t>georgian</a:t>
-            </a:r>
-            <a:r>
-              <a:rPr lang="en-US" dirty="0"/>
-              <a:t>,</a:t>
-            </a:r>
-            <a:r>
-              <a:rPr lang="en-US" dirty="0" smtClean="0"/>
-              <a:t> lower-alpha, upper-alpha, none</a:t>
-            </a:r>
-          </a:p>
-          <a:p>
-            <a:r>
-              <a:rPr lang="en-US" dirty="0" smtClean="0"/>
-              <a:t>list-style-position: inside, outside</a:t>
-            </a:r>
-          </a:p>
-          <a:p>
-            <a:r>
-              <a:rPr lang="en-US" dirty="0" smtClean="0"/>
-              <a:t>List-style-image: </a:t>
-            </a:r>
-            <a:r>
-              <a:rPr lang="en-US" dirty="0" err="1" smtClean="0"/>
-              <a:t>url</a:t>
-            </a:r>
-            <a:r>
-              <a:rPr lang="en-US" dirty="0" smtClean="0"/>
-              <a:t>('</a:t>
-            </a:r>
-            <a:r>
-              <a:rPr lang="en-US" dirty="0" err="1" smtClean="0"/>
-              <a:t>bullet.png</a:t>
-            </a:r>
-            <a:r>
-              <a:rPr lang="en-US" dirty="0" smtClean="0"/>
-              <a:t>'), none</a:t>
-            </a:r>
-          </a:p>
-          <a:p>
-            <a:r>
-              <a:rPr lang="en-US" sz="2000" dirty="0" smtClean="0">
-                <a:latin typeface="Courier New"/>
-                <a:cs typeface="Courier New"/>
-              </a:rPr>
-              <a:t>list-style: disc inside none;</a:t>
-            </a:r>
-          </a:p>
-          <a:p>
+              <a:t>border</a:t>
+            </a:r>
             <a:endParaRPr lang="en-US" dirty="0"/>
           </a:p>
-        </p:txBody>
-      </p:sp>
-      <p:sp>
-        <p:nvSpPr>
-          <p:cNvPr id="4" name="Footer Placeholder 3"/>
-          <p:cNvSpPr>
-            <a:spLocks noGrp="1"/>
-          </p:cNvSpPr>
-          <p:nvPr>
-            <p:ph type="ftr" sz="quarter" idx="11"/>
-          </p:nvPr>
-        </p:nvSpPr>
-        <p:spPr/>
-        <p:txBody>
-          <a:bodyPr/>
-          <a:lstStyle/>
-          <a:p>
-            <a:r>
-              <a:rPr lang="en-US" dirty="0"/>
-              <a:t>http://</a:t>
-            </a:r>
-            <a:r>
-              <a:rPr lang="en-US" dirty="0" err="1"/>
-              <a:t>dl.dropbox.com</a:t>
-            </a:r>
-            <a:r>
-              <a:rPr lang="en-US" dirty="0"/>
-              <a:t>/u/41609448/art329/slides/</a:t>
-            </a:r>
-            <a:r>
-              <a:rPr lang="en-US" dirty="0" err="1"/>
-              <a:t>classfour</a:t>
-            </a:r>
-            <a:r>
-              <a:rPr lang="en-US" dirty="0"/>
-              <a:t>/slides</a:t>
-            </a:r>
-            <a:r>
-              <a:rPr lang="en-US" dirty="0" smtClean="0"/>
-              <a:t>/</a:t>
-            </a:r>
-            <a:r>
-              <a:rPr lang="en-US" dirty="0" err="1" smtClean="0"/>
-              <a:t>liststyle</a:t>
-            </a:r>
-            <a:r>
-              <a:rPr lang="en-US" dirty="0" smtClean="0"/>
-              <a:t>/</a:t>
-            </a:r>
-            <a:r>
-              <a:rPr lang="en-US" dirty="0" err="1"/>
-              <a:t>index.html</a:t>
-            </a:r>
-            <a:endParaRPr lang="en-US" dirty="0"/>
+          <a:p>
+            <a:r>
+              <a:rPr lang="en-US" dirty="0" smtClean="0"/>
+              <a:t>margin</a:t>
+            </a:r>
           </a:p>
         </p:txBody>
       </p:sp>
     </p:spTree>
     <p:extLst>
       <p:ext uri="{BB962C8B-B14F-4D97-AF65-F5344CB8AC3E}">
-        <p14:creationId xmlns:p14="http://schemas.microsoft.com/office/powerpoint/2010/main" val="3840415387"/>
+        <p14:creationId xmlns:p14="http://schemas.microsoft.com/office/powerpoint/2010/main" val="1293711312"/>
       </p:ext>
     </p:extLst>
   </p:cSld>
   <p:clrMapOvr>
     <a:masterClrMapping/>
   </p:clrMapOvr>
+  <p:timing>
+    <p:tnLst>
+      <p:par>
+        <p:cTn xmlns:p14="http://schemas.microsoft.com/office/powerpoint/2010/main" id="1" dur="indefinite" restart="never" nodeType="tmRoot"/>
+      </p:par>
+    </p:tnLst>
+  </p:timing>
 </p:sld>
 </file>
 

</xml_diff>